<commit_message>
ui added somethings neü
</commit_message>
<xml_diff>
--- a/.lessons (az)/67 Uİ/1 UI.pptx
+++ b/.lessons (az)/67 Uİ/1 UI.pptx
@@ -5,7 +5,7 @@
     <p:sldMasterId id="2147483648" r:id="rId1"/>
   </p:sldMasterIdLst>
   <p:notesMasterIdLst>
-    <p:notesMasterId r:id="rId13"/>
+    <p:notesMasterId r:id="rId16"/>
   </p:notesMasterIdLst>
   <p:sldIdLst>
     <p:sldId id="590" r:id="rId2"/>
@@ -18,7 +18,10 @@
     <p:sldId id="597" r:id="rId9"/>
     <p:sldId id="598" r:id="rId10"/>
     <p:sldId id="599" r:id="rId11"/>
-    <p:sldId id="600" r:id="rId12"/>
+    <p:sldId id="601" r:id="rId12"/>
+    <p:sldId id="602" r:id="rId13"/>
+    <p:sldId id="603" r:id="rId14"/>
+    <p:sldId id="600" r:id="rId15"/>
   </p:sldIdLst>
   <p:sldSz cx="12192000" cy="6858000"/>
   <p:notesSz cx="6858000" cy="9144000"/>
@@ -207,7 +210,7 @@
           <a:p>
             <a:fld id="{1B030278-45DC-4534-B67E-11EB3832C02B}" type="datetimeFigureOut">
               <a:rPr lang="en-US" smtClean="0"/>
-              <a:t>4/7/2025</a:t>
+              <a:t>4/8/2025</a:t>
             </a:fld>
             <a:endParaRPr lang="en-US"/>
           </a:p>
@@ -698,6 +701,330 @@
         <p:cNvPr id="1" name="">
           <a:extLst>
             <a:ext uri="{FF2B5EF4-FFF2-40B4-BE49-F238E27FC236}">
+              <a16:creationId xmlns:a16="http://schemas.microsoft.com/office/drawing/2014/main" id="{2205FFDB-FA6B-5621-EF3E-2321881B3F08}"/>
+            </a:ext>
+          </a:extLst>
+        </p:cNvPr>
+        <p:cNvGrpSpPr/>
+        <p:nvPr/>
+      </p:nvGrpSpPr>
+      <p:grpSpPr>
+        <a:xfrm>
+          <a:off x="0" y="0"/>
+          <a:ext cx="0" cy="0"/>
+          <a:chOff x="0" y="0"/>
+          <a:chExt cx="0" cy="0"/>
+        </a:xfrm>
+      </p:grpSpPr>
+      <p:sp>
+        <p:nvSpPr>
+          <p:cNvPr id="2" name="Slide Image Placeholder 1">
+            <a:extLst>
+              <a:ext uri="{FF2B5EF4-FFF2-40B4-BE49-F238E27FC236}">
+                <a16:creationId xmlns:a16="http://schemas.microsoft.com/office/drawing/2014/main" id="{1468E05E-BE81-BAD3-5465-CDC2241C08F2}"/>
+              </a:ext>
+            </a:extLst>
+          </p:cNvPr>
+          <p:cNvSpPr>
+            <a:spLocks noGrp="1" noRot="1" noChangeAspect="1"/>
+          </p:cNvSpPr>
+          <p:nvPr>
+            <p:ph type="sldImg"/>
+          </p:nvPr>
+        </p:nvSpPr>
+        <p:spPr/>
+      </p:sp>
+      <p:sp>
+        <p:nvSpPr>
+          <p:cNvPr id="3" name="Notes Placeholder 2">
+            <a:extLst>
+              <a:ext uri="{FF2B5EF4-FFF2-40B4-BE49-F238E27FC236}">
+                <a16:creationId xmlns:a16="http://schemas.microsoft.com/office/drawing/2014/main" id="{22B2049B-0EB4-6E42-BE01-70EC9148F08C}"/>
+              </a:ext>
+            </a:extLst>
+          </p:cNvPr>
+          <p:cNvSpPr>
+            <a:spLocks noGrp="1"/>
+          </p:cNvSpPr>
+          <p:nvPr>
+            <p:ph type="body" idx="1"/>
+          </p:nvPr>
+        </p:nvSpPr>
+        <p:spPr/>
+        <p:txBody>
+          <a:bodyPr/>
+          <a:lstStyle/>
+          <a:p>
+            <a:endParaRPr lang="en-US"/>
+          </a:p>
+        </p:txBody>
+      </p:sp>
+      <p:sp>
+        <p:nvSpPr>
+          <p:cNvPr id="4" name="Slide Number Placeholder 3">
+            <a:extLst>
+              <a:ext uri="{FF2B5EF4-FFF2-40B4-BE49-F238E27FC236}">
+                <a16:creationId xmlns:a16="http://schemas.microsoft.com/office/drawing/2014/main" id="{65259FAD-F197-0240-0314-CF0185A53B8A}"/>
+              </a:ext>
+            </a:extLst>
+          </p:cNvPr>
+          <p:cNvSpPr>
+            <a:spLocks noGrp="1"/>
+          </p:cNvSpPr>
+          <p:nvPr>
+            <p:ph type="sldNum" sz="quarter" idx="5"/>
+          </p:nvPr>
+        </p:nvSpPr>
+        <p:spPr/>
+        <p:txBody>
+          <a:bodyPr/>
+          <a:lstStyle/>
+          <a:p>
+            <a:fld id="{659E7695-2856-4E04-B435-7203877CB9AD}" type="slidenum">
+              <a:rPr lang="en-US" smtClean="0"/>
+              <a:t>11</a:t>
+            </a:fld>
+            <a:endParaRPr lang="en-US"/>
+          </a:p>
+        </p:txBody>
+      </p:sp>
+    </p:spTree>
+    <p:extLst>
+      <p:ext uri="{BB962C8B-B14F-4D97-AF65-F5344CB8AC3E}">
+        <p14:creationId xmlns:p14="http://schemas.microsoft.com/office/powerpoint/2010/main" val="4253990134"/>
+      </p:ext>
+    </p:extLst>
+  </p:cSld>
+  <p:clrMapOvr>
+    <a:masterClrMapping/>
+  </p:clrMapOvr>
+</p:notes>
+</file>
+
+<file path=ppt/notesSlides/notesSlide12.xml><?xml version="1.0" encoding="utf-8"?>
+<p:notes xmlns:a="http://schemas.openxmlformats.org/drawingml/2006/main" xmlns:r="http://schemas.openxmlformats.org/officeDocument/2006/relationships" xmlns:p="http://schemas.openxmlformats.org/presentationml/2006/main">
+  <p:cSld>
+    <p:spTree>
+      <p:nvGrpSpPr>
+        <p:cNvPr id="1" name="">
+          <a:extLst>
+            <a:ext uri="{FF2B5EF4-FFF2-40B4-BE49-F238E27FC236}">
+              <a16:creationId xmlns:a16="http://schemas.microsoft.com/office/drawing/2014/main" id="{137260FA-5EDD-3829-DC14-CA85FC588D2A}"/>
+            </a:ext>
+          </a:extLst>
+        </p:cNvPr>
+        <p:cNvGrpSpPr/>
+        <p:nvPr/>
+      </p:nvGrpSpPr>
+      <p:grpSpPr>
+        <a:xfrm>
+          <a:off x="0" y="0"/>
+          <a:ext cx="0" cy="0"/>
+          <a:chOff x="0" y="0"/>
+          <a:chExt cx="0" cy="0"/>
+        </a:xfrm>
+      </p:grpSpPr>
+      <p:sp>
+        <p:nvSpPr>
+          <p:cNvPr id="2" name="Slide Image Placeholder 1">
+            <a:extLst>
+              <a:ext uri="{FF2B5EF4-FFF2-40B4-BE49-F238E27FC236}">
+                <a16:creationId xmlns:a16="http://schemas.microsoft.com/office/drawing/2014/main" id="{26519C67-2E12-44BC-58F3-B5C150531D30}"/>
+              </a:ext>
+            </a:extLst>
+          </p:cNvPr>
+          <p:cNvSpPr>
+            <a:spLocks noGrp="1" noRot="1" noChangeAspect="1"/>
+          </p:cNvSpPr>
+          <p:nvPr>
+            <p:ph type="sldImg"/>
+          </p:nvPr>
+        </p:nvSpPr>
+        <p:spPr/>
+      </p:sp>
+      <p:sp>
+        <p:nvSpPr>
+          <p:cNvPr id="3" name="Notes Placeholder 2">
+            <a:extLst>
+              <a:ext uri="{FF2B5EF4-FFF2-40B4-BE49-F238E27FC236}">
+                <a16:creationId xmlns:a16="http://schemas.microsoft.com/office/drawing/2014/main" id="{D3F0E00E-DD5A-32FF-B9F6-3CCC292855A2}"/>
+              </a:ext>
+            </a:extLst>
+          </p:cNvPr>
+          <p:cNvSpPr>
+            <a:spLocks noGrp="1"/>
+          </p:cNvSpPr>
+          <p:nvPr>
+            <p:ph type="body" idx="1"/>
+          </p:nvPr>
+        </p:nvSpPr>
+        <p:spPr/>
+        <p:txBody>
+          <a:bodyPr/>
+          <a:lstStyle/>
+          <a:p>
+            <a:endParaRPr lang="en-US"/>
+          </a:p>
+        </p:txBody>
+      </p:sp>
+      <p:sp>
+        <p:nvSpPr>
+          <p:cNvPr id="4" name="Slide Number Placeholder 3">
+            <a:extLst>
+              <a:ext uri="{FF2B5EF4-FFF2-40B4-BE49-F238E27FC236}">
+                <a16:creationId xmlns:a16="http://schemas.microsoft.com/office/drawing/2014/main" id="{A01687CA-1910-0083-87EF-861E6FEB8F6F}"/>
+              </a:ext>
+            </a:extLst>
+          </p:cNvPr>
+          <p:cNvSpPr>
+            <a:spLocks noGrp="1"/>
+          </p:cNvSpPr>
+          <p:nvPr>
+            <p:ph type="sldNum" sz="quarter" idx="5"/>
+          </p:nvPr>
+        </p:nvSpPr>
+        <p:spPr/>
+        <p:txBody>
+          <a:bodyPr/>
+          <a:lstStyle/>
+          <a:p>
+            <a:fld id="{659E7695-2856-4E04-B435-7203877CB9AD}" type="slidenum">
+              <a:rPr lang="en-US" smtClean="0"/>
+              <a:t>12</a:t>
+            </a:fld>
+            <a:endParaRPr lang="en-US"/>
+          </a:p>
+        </p:txBody>
+      </p:sp>
+    </p:spTree>
+    <p:extLst>
+      <p:ext uri="{BB962C8B-B14F-4D97-AF65-F5344CB8AC3E}">
+        <p14:creationId xmlns:p14="http://schemas.microsoft.com/office/powerpoint/2010/main" val="1983483656"/>
+      </p:ext>
+    </p:extLst>
+  </p:cSld>
+  <p:clrMapOvr>
+    <a:masterClrMapping/>
+  </p:clrMapOvr>
+</p:notes>
+</file>
+
+<file path=ppt/notesSlides/notesSlide13.xml><?xml version="1.0" encoding="utf-8"?>
+<p:notes xmlns:a="http://schemas.openxmlformats.org/drawingml/2006/main" xmlns:r="http://schemas.openxmlformats.org/officeDocument/2006/relationships" xmlns:p="http://schemas.openxmlformats.org/presentationml/2006/main">
+  <p:cSld>
+    <p:spTree>
+      <p:nvGrpSpPr>
+        <p:cNvPr id="1" name="">
+          <a:extLst>
+            <a:ext uri="{FF2B5EF4-FFF2-40B4-BE49-F238E27FC236}">
+              <a16:creationId xmlns:a16="http://schemas.microsoft.com/office/drawing/2014/main" id="{08C65B03-615D-0C5C-E38C-D8A10C8829EA}"/>
+            </a:ext>
+          </a:extLst>
+        </p:cNvPr>
+        <p:cNvGrpSpPr/>
+        <p:nvPr/>
+      </p:nvGrpSpPr>
+      <p:grpSpPr>
+        <a:xfrm>
+          <a:off x="0" y="0"/>
+          <a:ext cx="0" cy="0"/>
+          <a:chOff x="0" y="0"/>
+          <a:chExt cx="0" cy="0"/>
+        </a:xfrm>
+      </p:grpSpPr>
+      <p:sp>
+        <p:nvSpPr>
+          <p:cNvPr id="2" name="Slide Image Placeholder 1">
+            <a:extLst>
+              <a:ext uri="{FF2B5EF4-FFF2-40B4-BE49-F238E27FC236}">
+                <a16:creationId xmlns:a16="http://schemas.microsoft.com/office/drawing/2014/main" id="{93B8AA5E-3129-3948-6275-32B99DA6D5CA}"/>
+              </a:ext>
+            </a:extLst>
+          </p:cNvPr>
+          <p:cNvSpPr>
+            <a:spLocks noGrp="1" noRot="1" noChangeAspect="1"/>
+          </p:cNvSpPr>
+          <p:nvPr>
+            <p:ph type="sldImg"/>
+          </p:nvPr>
+        </p:nvSpPr>
+        <p:spPr/>
+      </p:sp>
+      <p:sp>
+        <p:nvSpPr>
+          <p:cNvPr id="3" name="Notes Placeholder 2">
+            <a:extLst>
+              <a:ext uri="{FF2B5EF4-FFF2-40B4-BE49-F238E27FC236}">
+                <a16:creationId xmlns:a16="http://schemas.microsoft.com/office/drawing/2014/main" id="{BB2FC1AF-ED5A-C2FF-C010-D6A04B35CC4D}"/>
+              </a:ext>
+            </a:extLst>
+          </p:cNvPr>
+          <p:cNvSpPr>
+            <a:spLocks noGrp="1"/>
+          </p:cNvSpPr>
+          <p:nvPr>
+            <p:ph type="body" idx="1"/>
+          </p:nvPr>
+        </p:nvSpPr>
+        <p:spPr/>
+        <p:txBody>
+          <a:bodyPr/>
+          <a:lstStyle/>
+          <a:p>
+            <a:endParaRPr lang="en-US"/>
+          </a:p>
+        </p:txBody>
+      </p:sp>
+      <p:sp>
+        <p:nvSpPr>
+          <p:cNvPr id="4" name="Slide Number Placeholder 3">
+            <a:extLst>
+              <a:ext uri="{FF2B5EF4-FFF2-40B4-BE49-F238E27FC236}">
+                <a16:creationId xmlns:a16="http://schemas.microsoft.com/office/drawing/2014/main" id="{08BBB735-757D-5A6C-DE34-D2E096E8100D}"/>
+              </a:ext>
+            </a:extLst>
+          </p:cNvPr>
+          <p:cNvSpPr>
+            <a:spLocks noGrp="1"/>
+          </p:cNvSpPr>
+          <p:nvPr>
+            <p:ph type="sldNum" sz="quarter" idx="5"/>
+          </p:nvPr>
+        </p:nvSpPr>
+        <p:spPr/>
+        <p:txBody>
+          <a:bodyPr/>
+          <a:lstStyle/>
+          <a:p>
+            <a:fld id="{659E7695-2856-4E04-B435-7203877CB9AD}" type="slidenum">
+              <a:rPr lang="en-US" smtClean="0"/>
+              <a:t>13</a:t>
+            </a:fld>
+            <a:endParaRPr lang="en-US"/>
+          </a:p>
+        </p:txBody>
+      </p:sp>
+    </p:spTree>
+    <p:extLst>
+      <p:ext uri="{BB962C8B-B14F-4D97-AF65-F5344CB8AC3E}">
+        <p14:creationId xmlns:p14="http://schemas.microsoft.com/office/powerpoint/2010/main" val="1040215461"/>
+      </p:ext>
+    </p:extLst>
+  </p:cSld>
+  <p:clrMapOvr>
+    <a:masterClrMapping/>
+  </p:clrMapOvr>
+</p:notes>
+</file>
+
+<file path=ppt/notesSlides/notesSlide14.xml><?xml version="1.0" encoding="utf-8"?>
+<p:notes xmlns:a="http://schemas.openxmlformats.org/drawingml/2006/main" xmlns:r="http://schemas.openxmlformats.org/officeDocument/2006/relationships" xmlns:p="http://schemas.openxmlformats.org/presentationml/2006/main">
+  <p:cSld>
+    <p:spTree>
+      <p:nvGrpSpPr>
+        <p:cNvPr id="1" name="">
+          <a:extLst>
+            <a:ext uri="{FF2B5EF4-FFF2-40B4-BE49-F238E27FC236}">
               <a16:creationId xmlns:a16="http://schemas.microsoft.com/office/drawing/2014/main" id="{E852F895-F809-68B2-2664-A9BB9D1476D4}"/>
             </a:ext>
           </a:extLst>
@@ -779,7 +1106,7 @@
           <a:p>
             <a:fld id="{659E7695-2856-4E04-B435-7203877CB9AD}" type="slidenum">
               <a:rPr lang="en-US" smtClean="0"/>
-              <a:t>11</a:t>
+              <a:t>14</a:t>
             </a:fld>
             <a:endParaRPr lang="en-US"/>
           </a:p>
@@ -1809,7 +2136,7 @@
           <a:p>
             <a:fld id="{CA16844A-366F-47C4-B77D-42DFAB3943AB}" type="datetimeFigureOut">
               <a:rPr lang="en-US" smtClean="0"/>
-              <a:t>4/7/2025</a:t>
+              <a:t>4/8/2025</a:t>
             </a:fld>
             <a:endParaRPr lang="en-US"/>
           </a:p>
@@ -2007,7 +2334,7 @@
           <a:p>
             <a:fld id="{CA16844A-366F-47C4-B77D-42DFAB3943AB}" type="datetimeFigureOut">
               <a:rPr lang="en-US" smtClean="0"/>
-              <a:t>4/7/2025</a:t>
+              <a:t>4/8/2025</a:t>
             </a:fld>
             <a:endParaRPr lang="en-US"/>
           </a:p>
@@ -2215,7 +2542,7 @@
           <a:p>
             <a:fld id="{CA16844A-366F-47C4-B77D-42DFAB3943AB}" type="datetimeFigureOut">
               <a:rPr lang="en-US" smtClean="0"/>
-              <a:t>4/7/2025</a:t>
+              <a:t>4/8/2025</a:t>
             </a:fld>
             <a:endParaRPr lang="en-US"/>
           </a:p>
@@ -2413,7 +2740,7 @@
           <a:p>
             <a:fld id="{CA16844A-366F-47C4-B77D-42DFAB3943AB}" type="datetimeFigureOut">
               <a:rPr lang="en-US" smtClean="0"/>
-              <a:t>4/7/2025</a:t>
+              <a:t>4/8/2025</a:t>
             </a:fld>
             <a:endParaRPr lang="en-US"/>
           </a:p>
@@ -2688,7 +3015,7 @@
           <a:p>
             <a:fld id="{CA16844A-366F-47C4-B77D-42DFAB3943AB}" type="datetimeFigureOut">
               <a:rPr lang="en-US" smtClean="0"/>
-              <a:t>4/7/2025</a:t>
+              <a:t>4/8/2025</a:t>
             </a:fld>
             <a:endParaRPr lang="en-US"/>
           </a:p>
@@ -2953,7 +3280,7 @@
           <a:p>
             <a:fld id="{CA16844A-366F-47C4-B77D-42DFAB3943AB}" type="datetimeFigureOut">
               <a:rPr lang="en-US" smtClean="0"/>
-              <a:t>4/7/2025</a:t>
+              <a:t>4/8/2025</a:t>
             </a:fld>
             <a:endParaRPr lang="en-US"/>
           </a:p>
@@ -3365,7 +3692,7 @@
           <a:p>
             <a:fld id="{CA16844A-366F-47C4-B77D-42DFAB3943AB}" type="datetimeFigureOut">
               <a:rPr lang="en-US" smtClean="0"/>
-              <a:t>4/7/2025</a:t>
+              <a:t>4/8/2025</a:t>
             </a:fld>
             <a:endParaRPr lang="en-US"/>
           </a:p>
@@ -3506,7 +3833,7 @@
           <a:p>
             <a:fld id="{CA16844A-366F-47C4-B77D-42DFAB3943AB}" type="datetimeFigureOut">
               <a:rPr lang="en-US" smtClean="0"/>
-              <a:t>4/7/2025</a:t>
+              <a:t>4/8/2025</a:t>
             </a:fld>
             <a:endParaRPr lang="en-US"/>
           </a:p>
@@ -3619,7 +3946,7 @@
           <a:p>
             <a:fld id="{CA16844A-366F-47C4-B77D-42DFAB3943AB}" type="datetimeFigureOut">
               <a:rPr lang="en-US" smtClean="0"/>
-              <a:t>4/7/2025</a:t>
+              <a:t>4/8/2025</a:t>
             </a:fld>
             <a:endParaRPr lang="en-US"/>
           </a:p>
@@ -3930,7 +4257,7 @@
           <a:p>
             <a:fld id="{CA16844A-366F-47C4-B77D-42DFAB3943AB}" type="datetimeFigureOut">
               <a:rPr lang="en-US" smtClean="0"/>
-              <a:t>4/7/2025</a:t>
+              <a:t>4/8/2025</a:t>
             </a:fld>
             <a:endParaRPr lang="en-US"/>
           </a:p>
@@ -4218,7 +4545,7 @@
           <a:p>
             <a:fld id="{CA16844A-366F-47C4-B77D-42DFAB3943AB}" type="datetimeFigureOut">
               <a:rPr lang="en-US" smtClean="0"/>
-              <a:t>4/7/2025</a:t>
+              <a:t>4/8/2025</a:t>
             </a:fld>
             <a:endParaRPr lang="en-US"/>
           </a:p>
@@ -4459,7 +4786,7 @@
           <a:p>
             <a:fld id="{CA16844A-366F-47C4-B77D-42DFAB3943AB}" type="datetimeFigureOut">
               <a:rPr lang="en-US" smtClean="0"/>
-              <a:t>4/7/2025</a:t>
+              <a:t>4/8/2025</a:t>
             </a:fld>
             <a:endParaRPr lang="en-US"/>
           </a:p>
@@ -5216,7 +5543,7 @@
         <p:spPr>
           <a:xfrm>
             <a:off x="107004" y="158874"/>
-            <a:ext cx="11984477" cy="338554"/>
+            <a:ext cx="11984477" cy="6001643"/>
           </a:xfrm>
           <a:prstGeom prst="rect">
             <a:avLst/>
@@ -5229,16 +5556,457 @@
           </a:bodyPr>
           <a:lstStyle/>
           <a:p>
+            <a:pPr>
+              <a:buNone/>
+            </a:pPr>
+            <a:r>
+              <a:rPr lang="ru-RU" sz="1200" b="0" i="0">
+                <a:solidFill>
+                  <a:srgbClr val="303141"/>
+                </a:solidFill>
+                <a:effectLst/>
+                <a:latin typeface="Arial" panose="020B0604020202020204" pitchFamily="34" charset="0"/>
+                <a:cs typeface="Arial" panose="020B0604020202020204" pitchFamily="34" charset="0"/>
+              </a:rPr>
+              <a:t> </a:t>
+            </a:r>
+            <a:r>
+              <a:rPr lang="en-US" sz="1200" b="1">
+                <a:latin typeface="Arial" panose="020B0604020202020204" pitchFamily="34" charset="0"/>
+                <a:cs typeface="Arial" panose="020B0604020202020204" pitchFamily="34" charset="0"/>
+              </a:rPr>
+              <a:t>🔷 6. Responsiveness Testi – Figma Maketdə Yoxdursa belə</a:t>
+            </a:r>
+          </a:p>
+          <a:p>
+            <a:pPr>
+              <a:buNone/>
+            </a:pPr>
+            <a:r>
+              <a:rPr lang="en-US" sz="1200" b="1">
+                <a:latin typeface="Arial" panose="020B0604020202020204" pitchFamily="34" charset="0"/>
+                <a:cs typeface="Arial" panose="020B0604020202020204" pitchFamily="34" charset="0"/>
+              </a:rPr>
+              <a:t>Əgər Figma dizaynında mobil/tablet versiya yoxdursa belə:</a:t>
+            </a:r>
+          </a:p>
+          <a:p>
+            <a:pPr marL="171450" indent="-171450">
+              <a:buFont typeface="Arial" panose="020B0604020202020204" pitchFamily="34" charset="0"/>
+              <a:buChar char="•"/>
+            </a:pPr>
+            <a:r>
+              <a:rPr lang="en-US" sz="1200">
+                <a:latin typeface="Arial" panose="020B0604020202020204" pitchFamily="34" charset="0"/>
+                <a:cs typeface="Arial" panose="020B0604020202020204" pitchFamily="34" charset="0"/>
+              </a:rPr>
+              <a:t>Məntiqə əsasən elementlər mobil görünüşdə necə olmalıdır?</a:t>
+            </a:r>
+          </a:p>
+          <a:p>
+            <a:pPr marL="171450" indent="-171450">
+              <a:buFont typeface="Arial" panose="020B0604020202020204" pitchFamily="34" charset="0"/>
+              <a:buChar char="•"/>
+            </a:pPr>
+            <a:r>
+              <a:rPr lang="en-US" sz="1200">
+                <a:latin typeface="Arial" panose="020B0604020202020204" pitchFamily="34" charset="0"/>
+                <a:cs typeface="Arial" panose="020B0604020202020204" pitchFamily="34" charset="0"/>
+              </a:rPr>
+              <a:t>Hər hansı bir </a:t>
+            </a:r>
+            <a:r>
+              <a:rPr lang="en-US" sz="1200" b="1">
+                <a:latin typeface="Arial" panose="020B0604020202020204" pitchFamily="34" charset="0"/>
+                <a:cs typeface="Arial" panose="020B0604020202020204" pitchFamily="34" charset="0"/>
+              </a:rPr>
+              <a:t>responsive problemi</a:t>
+            </a:r>
+            <a:r>
+              <a:rPr lang="en-US" sz="1200">
+                <a:latin typeface="Arial" panose="020B0604020202020204" pitchFamily="34" charset="0"/>
+                <a:cs typeface="Arial" panose="020B0604020202020204" pitchFamily="34" charset="0"/>
+              </a:rPr>
+              <a:t> varsa, dizayn komandası ilə müzakirə et</a:t>
+            </a:r>
+          </a:p>
+          <a:p>
             <a:pPr algn="l"/>
-            <a:r>
-              <a:rPr lang="ru-RU" sz="1600" b="0" i="0">
-                <a:solidFill>
-                  <a:srgbClr val="303141"/>
+            <a:endParaRPr lang="az-Latn-AZ" sz="1200" b="0" i="0">
+              <a:solidFill>
+                <a:srgbClr val="303141"/>
+              </a:solidFill>
+              <a:effectLst/>
+              <a:latin typeface="Arial" panose="020B0604020202020204" pitchFamily="34" charset="0"/>
+              <a:cs typeface="Arial" panose="020B0604020202020204" pitchFamily="34" charset="0"/>
+            </a:endParaRPr>
+          </a:p>
+          <a:p>
+            <a:pPr algn="l"/>
+            <a:endParaRPr lang="az-Latn-AZ" sz="1200" b="0" i="0">
+              <a:solidFill>
+                <a:srgbClr val="303141"/>
+              </a:solidFill>
+              <a:effectLst/>
+              <a:latin typeface="Arial" panose="020B0604020202020204" pitchFamily="34" charset="0"/>
+              <a:cs typeface="Arial" panose="020B0604020202020204" pitchFamily="34" charset="0"/>
+            </a:endParaRPr>
+          </a:p>
+          <a:p>
+            <a:pPr algn="l"/>
+            <a:endParaRPr lang="az-Latn-AZ" sz="1200">
+              <a:solidFill>
+                <a:srgbClr val="303141"/>
+              </a:solidFill>
+              <a:latin typeface="Arial" panose="020B0604020202020204" pitchFamily="34" charset="0"/>
+              <a:cs typeface="Arial" panose="020B0604020202020204" pitchFamily="34" charset="0"/>
+            </a:endParaRPr>
+          </a:p>
+          <a:p>
+            <a:pPr algn="l"/>
+            <a:endParaRPr lang="az-Latn-AZ" sz="1200">
+              <a:solidFill>
+                <a:srgbClr val="303141"/>
+              </a:solidFill>
+              <a:latin typeface="Arial" panose="020B0604020202020204" pitchFamily="34" charset="0"/>
+              <a:cs typeface="Arial" panose="020B0604020202020204" pitchFamily="34" charset="0"/>
+            </a:endParaRPr>
+          </a:p>
+          <a:p>
+            <a:pPr algn="l"/>
+            <a:endParaRPr lang="az-Latn-AZ" sz="1200" b="0" i="0">
+              <a:solidFill>
+                <a:srgbClr val="303141"/>
+              </a:solidFill>
+              <a:effectLst/>
+              <a:latin typeface="Arial" panose="020B0604020202020204" pitchFamily="34" charset="0"/>
+              <a:cs typeface="Arial" panose="020B0604020202020204" pitchFamily="34" charset="0"/>
+            </a:endParaRPr>
+          </a:p>
+          <a:p>
+            <a:pPr>
+              <a:buNone/>
+            </a:pPr>
+            <a:r>
+              <a:rPr lang="en-US" sz="1200" b="1">
+                <a:latin typeface="Arial" panose="020B0604020202020204" pitchFamily="34" charset="0"/>
+                <a:cs typeface="Arial" panose="020B0604020202020204" pitchFamily="34" charset="0"/>
+              </a:rPr>
+              <a:t>🔷 7. Icon və Şəkillər</a:t>
+            </a:r>
+          </a:p>
+          <a:p>
+            <a:pPr>
+              <a:buNone/>
+            </a:pPr>
+            <a:r>
+              <a:rPr lang="en-US" sz="1200" b="1">
+                <a:latin typeface="Arial" panose="020B0604020202020204" pitchFamily="34" charset="0"/>
+                <a:cs typeface="Arial" panose="020B0604020202020204" pitchFamily="34" charset="0"/>
+              </a:rPr>
+              <a:t>Yoxla:</a:t>
+            </a:r>
+          </a:p>
+          <a:p>
+            <a:pPr marL="171450" indent="-171450">
+              <a:buFont typeface="Arial" panose="020B0604020202020204" pitchFamily="34" charset="0"/>
+              <a:buChar char="•"/>
+            </a:pPr>
+            <a:r>
+              <a:rPr lang="en-US" sz="1200">
+                <a:latin typeface="Arial" panose="020B0604020202020204" pitchFamily="34" charset="0"/>
+                <a:cs typeface="Arial" panose="020B0604020202020204" pitchFamily="34" charset="0"/>
+              </a:rPr>
+              <a:t>Figma’dakı ikonlar real versiyada uyğun render olunubmu (ölçü, rəng, yerləşim)?</a:t>
+            </a:r>
+          </a:p>
+          <a:p>
+            <a:pPr marL="171450" indent="-171450">
+              <a:buFont typeface="Arial" panose="020B0604020202020204" pitchFamily="34" charset="0"/>
+              <a:buChar char="•"/>
+            </a:pPr>
+            <a:r>
+              <a:rPr lang="en-US" sz="1200">
+                <a:latin typeface="Arial" panose="020B0604020202020204" pitchFamily="34" charset="0"/>
+                <a:cs typeface="Arial" panose="020B0604020202020204" pitchFamily="34" charset="0"/>
+              </a:rPr>
+              <a:t>SVG ikonlardadırsa optimallaşdırılıb?</a:t>
+            </a:r>
+          </a:p>
+          <a:p>
+            <a:pPr marL="171450" indent="-171450">
+              <a:buFont typeface="Arial" panose="020B0604020202020204" pitchFamily="34" charset="0"/>
+              <a:buChar char="•"/>
+            </a:pPr>
+            <a:r>
+              <a:rPr lang="en-US" sz="1200">
+                <a:latin typeface="Arial" panose="020B0604020202020204" pitchFamily="34" charset="0"/>
+                <a:cs typeface="Arial" panose="020B0604020202020204" pitchFamily="34" charset="0"/>
+              </a:rPr>
+              <a:t>Şəkillərin formatı və ölçüsü (yüksek kilobyte olmasın) düzgünmü?</a:t>
+            </a:r>
+          </a:p>
+          <a:p>
+            <a:pPr algn="l"/>
+            <a:endParaRPr lang="az-Latn-AZ" sz="1200">
+              <a:solidFill>
+                <a:srgbClr val="303141"/>
+              </a:solidFill>
+              <a:latin typeface="Arial" panose="020B0604020202020204" pitchFamily="34" charset="0"/>
+              <a:cs typeface="Arial" panose="020B0604020202020204" pitchFamily="34" charset="0"/>
+            </a:endParaRPr>
+          </a:p>
+          <a:p>
+            <a:pPr algn="l"/>
+            <a:endParaRPr lang="az-Latn-AZ" sz="1200">
+              <a:solidFill>
+                <a:srgbClr val="303141"/>
+              </a:solidFill>
+              <a:latin typeface="Arial" panose="020B0604020202020204" pitchFamily="34" charset="0"/>
+              <a:cs typeface="Arial" panose="020B0604020202020204" pitchFamily="34" charset="0"/>
+            </a:endParaRPr>
+          </a:p>
+          <a:p>
+            <a:pPr algn="l"/>
+            <a:endParaRPr lang="az-Latn-AZ" sz="1200">
+              <a:solidFill>
+                <a:srgbClr val="303141"/>
+              </a:solidFill>
+              <a:latin typeface="Arial" panose="020B0604020202020204" pitchFamily="34" charset="0"/>
+              <a:cs typeface="Arial" panose="020B0604020202020204" pitchFamily="34" charset="0"/>
+            </a:endParaRPr>
+          </a:p>
+          <a:p>
+            <a:pPr algn="l"/>
+            <a:endParaRPr lang="az-Latn-AZ" sz="1200" b="0" i="0">
+              <a:solidFill>
+                <a:srgbClr val="303141"/>
+              </a:solidFill>
+              <a:effectLst/>
+              <a:latin typeface="Arial" panose="020B0604020202020204" pitchFamily="34" charset="0"/>
+              <a:cs typeface="Arial" panose="020B0604020202020204" pitchFamily="34" charset="0"/>
+            </a:endParaRPr>
+          </a:p>
+          <a:p>
+            <a:pPr algn="l"/>
+            <a:endParaRPr lang="az-Latn-AZ" sz="1200">
+              <a:solidFill>
+                <a:srgbClr val="303141"/>
+              </a:solidFill>
+              <a:latin typeface="Arial" panose="020B0604020202020204" pitchFamily="34" charset="0"/>
+              <a:cs typeface="Arial" panose="020B0604020202020204" pitchFamily="34" charset="0"/>
+            </a:endParaRPr>
+          </a:p>
+          <a:p>
+            <a:pPr>
+              <a:buNone/>
+            </a:pPr>
+            <a:r>
+              <a:rPr lang="en-US" sz="1200" b="1">
+                <a:latin typeface="Arial" panose="020B0604020202020204" pitchFamily="34" charset="0"/>
+                <a:cs typeface="Arial" panose="020B0604020202020204" pitchFamily="34" charset="0"/>
+              </a:rPr>
+              <a:t>🔷 8. UX Ssenarilər (Figma prototip varsa)</a:t>
+            </a:r>
+          </a:p>
+          <a:p>
+            <a:pPr>
+              <a:buNone/>
+            </a:pPr>
+            <a:r>
+              <a:rPr lang="en-US" sz="1200" b="1">
+                <a:latin typeface="Arial" panose="020B0604020202020204" pitchFamily="34" charset="0"/>
+                <a:cs typeface="Arial" panose="020B0604020202020204" pitchFamily="34" charset="0"/>
+              </a:rPr>
+              <a:t>Yoxla:</a:t>
+            </a:r>
+          </a:p>
+          <a:p>
+            <a:pPr marL="171450" indent="-171450">
+              <a:buFont typeface="Arial" panose="020B0604020202020204" pitchFamily="34" charset="0"/>
+              <a:buChar char="•"/>
+            </a:pPr>
+            <a:r>
+              <a:rPr lang="en-US" sz="1200">
+                <a:latin typeface="Arial" panose="020B0604020202020204" pitchFamily="34" charset="0"/>
+                <a:cs typeface="Arial" panose="020B0604020202020204" pitchFamily="34" charset="0"/>
+              </a:rPr>
+              <a:t>Figma prototipindəki keçidlər (məs: button → yeni səhifə) canlı versiyada düzgün işləyirmi?</a:t>
+            </a:r>
+          </a:p>
+          <a:p>
+            <a:pPr marL="171450" indent="-171450">
+              <a:buFont typeface="Arial" panose="020B0604020202020204" pitchFamily="34" charset="0"/>
+              <a:buChar char="•"/>
+            </a:pPr>
+            <a:r>
+              <a:rPr lang="en-US" sz="1200">
+                <a:latin typeface="Arial" panose="020B0604020202020204" pitchFamily="34" charset="0"/>
+                <a:cs typeface="Arial" panose="020B0604020202020204" pitchFamily="34" charset="0"/>
+              </a:rPr>
+              <a:t>Navigasiya axını (user journey) Figma’dakı ssenariyə uyğundurmu?</a:t>
+            </a:r>
+          </a:p>
+          <a:p>
+            <a:pPr marL="171450" indent="-171450">
+              <a:buFont typeface="Arial" panose="020B0604020202020204" pitchFamily="34" charset="0"/>
+              <a:buChar char="•"/>
+            </a:pPr>
+            <a:r>
+              <a:rPr lang="en-US" sz="1200">
+                <a:latin typeface="Arial" panose="020B0604020202020204" pitchFamily="34" charset="0"/>
+                <a:cs typeface="Arial" panose="020B0604020202020204" pitchFamily="34" charset="0"/>
+              </a:rPr>
+              <a:t>“Happy path” və “error path” ssenariləri test olunubmu?</a:t>
+            </a:r>
+          </a:p>
+          <a:p>
+            <a:pPr algn="l"/>
+            <a:endParaRPr lang="az-Latn-AZ" sz="1200" b="0" i="0">
+              <a:solidFill>
+                <a:srgbClr val="303141"/>
+              </a:solidFill>
+              <a:effectLst/>
+              <a:latin typeface="Arial" panose="020B0604020202020204" pitchFamily="34" charset="0"/>
+              <a:cs typeface="Arial" panose="020B0604020202020204" pitchFamily="34" charset="0"/>
+            </a:endParaRPr>
+          </a:p>
+          <a:p>
+            <a:pPr algn="l"/>
+            <a:endParaRPr lang="az-Latn-AZ" sz="1200" b="0" i="0">
+              <a:solidFill>
+                <a:srgbClr val="303141"/>
+              </a:solidFill>
+              <a:effectLst/>
+              <a:latin typeface="Arial" panose="020B0604020202020204" pitchFamily="34" charset="0"/>
+              <a:cs typeface="Arial" panose="020B0604020202020204" pitchFamily="34" charset="0"/>
+            </a:endParaRPr>
+          </a:p>
+          <a:p>
+            <a:pPr algn="l"/>
+            <a:endParaRPr lang="az-Latn-AZ" sz="1200">
+              <a:solidFill>
+                <a:srgbClr val="303141"/>
+              </a:solidFill>
+              <a:latin typeface="Arial" panose="020B0604020202020204" pitchFamily="34" charset="0"/>
+              <a:cs typeface="Arial" panose="020B0604020202020204" pitchFamily="34" charset="0"/>
+            </a:endParaRPr>
+          </a:p>
+          <a:p>
+            <a:pPr algn="l"/>
+            <a:endParaRPr lang="az-Latn-AZ" sz="1200">
+              <a:solidFill>
+                <a:srgbClr val="303141"/>
+              </a:solidFill>
+              <a:latin typeface="Arial" panose="020B0604020202020204" pitchFamily="34" charset="0"/>
+              <a:cs typeface="Arial" panose="020B0604020202020204" pitchFamily="34" charset="0"/>
+            </a:endParaRPr>
+          </a:p>
+          <a:p>
+            <a:pPr algn="l"/>
+            <a:endParaRPr lang="az-Latn-AZ" sz="1200" b="0" i="0">
+              <a:solidFill>
+                <a:srgbClr val="303141"/>
+              </a:solidFill>
+              <a:effectLst/>
+              <a:latin typeface="Arial" panose="020B0604020202020204" pitchFamily="34" charset="0"/>
+              <a:cs typeface="Arial" panose="020B0604020202020204" pitchFamily="34" charset="0"/>
+            </a:endParaRPr>
+          </a:p>
+          <a:p>
+            <a:pPr marL="0" marR="0" lvl="0" indent="0" algn="l" defTabSz="914400" rtl="0" eaLnBrk="0" fontAlgn="base" latinLnBrk="0" hangingPunct="0">
+              <a:lnSpc>
+                <a:spcPct val="100000"/>
+              </a:lnSpc>
+              <a:spcBef>
+                <a:spcPct val="0"/>
+              </a:spcBef>
+              <a:spcAft>
+                <a:spcPct val="0"/>
+              </a:spcAft>
+              <a:buClrTx/>
+              <a:buSzTx/>
+              <a:buFontTx/>
+              <a:buNone/>
+              <a:tabLst/>
+            </a:pPr>
+            <a:r>
+              <a:rPr kumimoji="0" lang="en-US" altLang="en-US" sz="1200" b="1" i="0" u="none" strike="noStrike" cap="none" normalizeH="0" baseline="0">
+                <a:ln>
+                  <a:noFill/>
+                </a:ln>
+                <a:solidFill>
+                  <a:schemeClr val="tx1"/>
                 </a:solidFill>
                 <a:effectLst/>
-                <a:latin typeface="Udemy Sans"/>
-              </a:rPr>
-              <a:t> </a:t>
+                <a:latin typeface="Arial" panose="020B0604020202020204" pitchFamily="34" charset="0"/>
+                <a:cs typeface="Arial" panose="020B0604020202020204" pitchFamily="34" charset="0"/>
+              </a:rPr>
+              <a:t>🔷 9. Figma Anotasiya və Komponent Strukturuna Diqqət</a:t>
+            </a:r>
+          </a:p>
+          <a:p>
+            <a:pPr marL="171450" marR="0" lvl="0" indent="-171450" algn="l" defTabSz="914400" rtl="0" eaLnBrk="0" fontAlgn="base" latinLnBrk="0" hangingPunct="0">
+              <a:lnSpc>
+                <a:spcPct val="100000"/>
+              </a:lnSpc>
+              <a:spcBef>
+                <a:spcPct val="0"/>
+              </a:spcBef>
+              <a:spcAft>
+                <a:spcPct val="0"/>
+              </a:spcAft>
+              <a:buClrTx/>
+              <a:buSzTx/>
+              <a:buFont typeface="Arial" panose="020B0604020202020204" pitchFamily="34" charset="0"/>
+              <a:buChar char="•"/>
+              <a:tabLst/>
+            </a:pPr>
+            <a:r>
+              <a:rPr kumimoji="0" lang="en-US" altLang="en-US" sz="1200" b="0" i="0" u="none" strike="noStrike" cap="none" normalizeH="0" baseline="0">
+                <a:ln>
+                  <a:noFill/>
+                </a:ln>
+                <a:solidFill>
+                  <a:schemeClr val="tx1"/>
+                </a:solidFill>
+                <a:effectLst/>
+                <a:latin typeface="Arial" panose="020B0604020202020204" pitchFamily="34" charset="0"/>
+                <a:cs typeface="Arial" panose="020B0604020202020204" pitchFamily="34" charset="0"/>
+              </a:rPr>
+              <a:t>Figma dizayneri hansı komponentlərdə reusable elementlər göstəribsə, development-də də bu komponent kimi reuse olunubmu?</a:t>
+            </a:r>
+          </a:p>
+          <a:p>
+            <a:pPr marL="171450" marR="0" lvl="0" indent="-171450" algn="l" defTabSz="914400" rtl="0" eaLnBrk="0" fontAlgn="base" latinLnBrk="0" hangingPunct="0">
+              <a:lnSpc>
+                <a:spcPct val="100000"/>
+              </a:lnSpc>
+              <a:spcBef>
+                <a:spcPct val="0"/>
+              </a:spcBef>
+              <a:spcAft>
+                <a:spcPct val="0"/>
+              </a:spcAft>
+              <a:buClrTx/>
+              <a:buSzTx/>
+              <a:buFont typeface="Arial" panose="020B0604020202020204" pitchFamily="34" charset="0"/>
+              <a:buChar char="•"/>
+              <a:tabLst/>
+            </a:pPr>
+            <a:r>
+              <a:rPr kumimoji="0" lang="en-US" altLang="en-US" sz="1200" b="0" i="0" u="none" strike="noStrike" cap="none" normalizeH="0" baseline="0">
+                <a:ln>
+                  <a:noFill/>
+                </a:ln>
+                <a:solidFill>
+                  <a:schemeClr val="tx1"/>
+                </a:solidFill>
+                <a:effectLst/>
+                <a:latin typeface="Arial" panose="020B0604020202020204" pitchFamily="34" charset="0"/>
+                <a:cs typeface="Arial" panose="020B0604020202020204" pitchFamily="34" charset="0"/>
+              </a:rPr>
+              <a:t>Repetitive pattern-lər DRY prinsipi ilə kodlanıbmı?</a:t>
             </a:r>
           </a:p>
         </p:txBody>
@@ -5257,6 +6025,653 @@
 </file>
 
 <file path=ppt/slides/slide11.xml><?xml version="1.0" encoding="utf-8"?>
+<p:sld xmlns:a="http://schemas.openxmlformats.org/drawingml/2006/main" xmlns:r="http://schemas.openxmlformats.org/officeDocument/2006/relationships" xmlns:p="http://schemas.openxmlformats.org/presentationml/2006/main">
+  <p:cSld>
+    <p:spTree>
+      <p:nvGrpSpPr>
+        <p:cNvPr id="1" name="">
+          <a:extLst>
+            <a:ext uri="{FF2B5EF4-FFF2-40B4-BE49-F238E27FC236}">
+              <a16:creationId xmlns:a16="http://schemas.microsoft.com/office/drawing/2014/main" id="{2E7FB5C0-AB17-E032-E222-6929FEB1367B}"/>
+            </a:ext>
+          </a:extLst>
+        </p:cNvPr>
+        <p:cNvGrpSpPr/>
+        <p:nvPr/>
+      </p:nvGrpSpPr>
+      <p:grpSpPr>
+        <a:xfrm>
+          <a:off x="0" y="0"/>
+          <a:ext cx="0" cy="0"/>
+          <a:chOff x="0" y="0"/>
+          <a:chExt cx="0" cy="0"/>
+        </a:xfrm>
+      </p:grpSpPr>
+      <p:sp>
+        <p:nvSpPr>
+          <p:cNvPr id="3" name="TextBox 2">
+            <a:extLst>
+              <a:ext uri="{FF2B5EF4-FFF2-40B4-BE49-F238E27FC236}">
+                <a16:creationId xmlns:a16="http://schemas.microsoft.com/office/drawing/2014/main" id="{AC3155C3-B0D1-52C9-5E2D-8955F73C60F4}"/>
+              </a:ext>
+            </a:extLst>
+          </p:cNvPr>
+          <p:cNvSpPr txBox="1"/>
+          <p:nvPr/>
+        </p:nvSpPr>
+        <p:spPr>
+          <a:xfrm>
+            <a:off x="107004" y="158874"/>
+            <a:ext cx="11984477" cy="4293483"/>
+          </a:xfrm>
+          <a:prstGeom prst="rect">
+            <a:avLst/>
+          </a:prstGeom>
+          <a:noFill/>
+        </p:spPr>
+        <p:txBody>
+          <a:bodyPr wrap="square">
+            <a:spAutoFit/>
+          </a:bodyPr>
+          <a:lstStyle/>
+          <a:p>
+            <a:pPr>
+              <a:buNone/>
+            </a:pPr>
+            <a:r>
+              <a:rPr lang="en-US" sz="1300" b="1">
+                <a:latin typeface="Arial" panose="020B0604020202020204" pitchFamily="34" charset="0"/>
+                <a:cs typeface="Arial" panose="020B0604020202020204" pitchFamily="34" charset="0"/>
+              </a:rPr>
+              <a:t>🔁 Repetitive pattern nədir?</a:t>
+            </a:r>
+          </a:p>
+          <a:p>
+            <a:pPr>
+              <a:buNone/>
+            </a:pPr>
+            <a:r>
+              <a:rPr lang="en-US" sz="1300">
+                <a:latin typeface="Arial" panose="020B0604020202020204" pitchFamily="34" charset="0"/>
+                <a:cs typeface="Arial" panose="020B0604020202020204" pitchFamily="34" charset="0"/>
+              </a:rPr>
+              <a:t>Saytda </a:t>
+            </a:r>
+            <a:r>
+              <a:rPr lang="en-US" sz="1300" b="1">
+                <a:latin typeface="Arial" panose="020B0604020202020204" pitchFamily="34" charset="0"/>
+                <a:cs typeface="Arial" panose="020B0604020202020204" pitchFamily="34" charset="0"/>
+              </a:rPr>
+              <a:t>təkrar-təkrar istifadə olunan</a:t>
+            </a:r>
+            <a:r>
+              <a:rPr lang="en-US" sz="1300">
+                <a:latin typeface="Arial" panose="020B0604020202020204" pitchFamily="34" charset="0"/>
+                <a:cs typeface="Arial" panose="020B0604020202020204" pitchFamily="34" charset="0"/>
+              </a:rPr>
+              <a:t> dizayn və komponent strukturlarıdır. Məsələn:</a:t>
+            </a:r>
+          </a:p>
+          <a:p>
+            <a:pPr marL="285750" indent="-285750">
+              <a:buFont typeface="Arial" panose="020B0604020202020204" pitchFamily="34" charset="0"/>
+              <a:buChar char="•"/>
+            </a:pPr>
+            <a:r>
+              <a:rPr lang="en-US" sz="1300">
+                <a:latin typeface="Arial" panose="020B0604020202020204" pitchFamily="34" charset="0"/>
+                <a:cs typeface="Arial" panose="020B0604020202020204" pitchFamily="34" charset="0"/>
+              </a:rPr>
+              <a:t>Kart komponenti (product card, user profile card və s.)</a:t>
+            </a:r>
+          </a:p>
+          <a:p>
+            <a:pPr marL="285750" indent="-285750">
+              <a:buFont typeface="Arial" panose="020B0604020202020204" pitchFamily="34" charset="0"/>
+              <a:buChar char="•"/>
+            </a:pPr>
+            <a:r>
+              <a:rPr lang="en-US" sz="1300">
+                <a:latin typeface="Arial" panose="020B0604020202020204" pitchFamily="34" charset="0"/>
+                <a:cs typeface="Arial" panose="020B0604020202020204" pitchFamily="34" charset="0"/>
+              </a:rPr>
+              <a:t>Button-lar (primary, secondary)</a:t>
+            </a:r>
+          </a:p>
+          <a:p>
+            <a:pPr marL="285750" indent="-285750">
+              <a:buFont typeface="Arial" panose="020B0604020202020204" pitchFamily="34" charset="0"/>
+              <a:buChar char="•"/>
+            </a:pPr>
+            <a:r>
+              <a:rPr lang="en-US" sz="1300">
+                <a:latin typeface="Arial" panose="020B0604020202020204" pitchFamily="34" charset="0"/>
+                <a:cs typeface="Arial" panose="020B0604020202020204" pitchFamily="34" charset="0"/>
+              </a:rPr>
+              <a:t>Input sahələri</a:t>
+            </a:r>
+          </a:p>
+          <a:p>
+            <a:pPr marL="285750" indent="-285750">
+              <a:buFont typeface="Arial" panose="020B0604020202020204" pitchFamily="34" charset="0"/>
+              <a:buChar char="•"/>
+            </a:pPr>
+            <a:r>
+              <a:rPr lang="en-US" sz="1300">
+                <a:latin typeface="Arial" panose="020B0604020202020204" pitchFamily="34" charset="0"/>
+                <a:cs typeface="Arial" panose="020B0604020202020204" pitchFamily="34" charset="0"/>
+              </a:rPr>
+              <a:t>Modal pəncərələr</a:t>
+            </a:r>
+          </a:p>
+          <a:p>
+            <a:r>
+              <a:rPr lang="en-US" sz="1300">
+                <a:latin typeface="Arial" panose="020B0604020202020204" pitchFamily="34" charset="0"/>
+                <a:cs typeface="Arial" panose="020B0604020202020204" pitchFamily="34" charset="0"/>
+              </a:rPr>
+              <a:t>Əgər bu komponentlər bir neçə yerdə istifadə olunursa, </a:t>
+            </a:r>
+            <a:r>
+              <a:rPr lang="en-US" sz="1300" b="1">
+                <a:latin typeface="Arial" panose="020B0604020202020204" pitchFamily="34" charset="0"/>
+                <a:cs typeface="Arial" panose="020B0604020202020204" pitchFamily="34" charset="0"/>
+              </a:rPr>
+              <a:t>hər dəfə sıfırdan yazılmamalıdır.</a:t>
+            </a:r>
+            <a:endParaRPr lang="en-US" sz="1300">
+              <a:latin typeface="Arial" panose="020B0604020202020204" pitchFamily="34" charset="0"/>
+              <a:cs typeface="Arial" panose="020B0604020202020204" pitchFamily="34" charset="0"/>
+            </a:endParaRPr>
+          </a:p>
+          <a:p>
+            <a:pPr>
+              <a:buNone/>
+            </a:pPr>
+            <a:endParaRPr lang="az-Latn-AZ" sz="1300" b="0" i="0">
+              <a:solidFill>
+                <a:srgbClr val="303141"/>
+              </a:solidFill>
+              <a:effectLst/>
+              <a:latin typeface="Arial" panose="020B0604020202020204" pitchFamily="34" charset="0"/>
+              <a:cs typeface="Arial" panose="020B0604020202020204" pitchFamily="34" charset="0"/>
+            </a:endParaRPr>
+          </a:p>
+          <a:p>
+            <a:pPr>
+              <a:buNone/>
+            </a:pPr>
+            <a:endParaRPr lang="az-Latn-AZ" sz="1300">
+              <a:solidFill>
+                <a:srgbClr val="303141"/>
+              </a:solidFill>
+              <a:latin typeface="Arial" panose="020B0604020202020204" pitchFamily="34" charset="0"/>
+              <a:cs typeface="Arial" panose="020B0604020202020204" pitchFamily="34" charset="0"/>
+            </a:endParaRPr>
+          </a:p>
+          <a:p>
+            <a:pPr>
+              <a:buNone/>
+            </a:pPr>
+            <a:endParaRPr lang="az-Latn-AZ" sz="1300" b="0" i="0">
+              <a:solidFill>
+                <a:srgbClr val="303141"/>
+              </a:solidFill>
+              <a:effectLst/>
+              <a:latin typeface="Arial" panose="020B0604020202020204" pitchFamily="34" charset="0"/>
+              <a:cs typeface="Arial" panose="020B0604020202020204" pitchFamily="34" charset="0"/>
+            </a:endParaRPr>
+          </a:p>
+          <a:p>
+            <a:pPr marL="0" marR="0" lvl="0" indent="0" algn="l" defTabSz="914400" rtl="0" eaLnBrk="0" fontAlgn="base" latinLnBrk="0" hangingPunct="0">
+              <a:lnSpc>
+                <a:spcPct val="100000"/>
+              </a:lnSpc>
+              <a:spcBef>
+                <a:spcPct val="0"/>
+              </a:spcBef>
+              <a:spcAft>
+                <a:spcPct val="0"/>
+              </a:spcAft>
+              <a:buClrTx/>
+              <a:buSzTx/>
+              <a:buFontTx/>
+              <a:buNone/>
+              <a:tabLst/>
+            </a:pPr>
+            <a:r>
+              <a:rPr lang="ru-RU" sz="1300" b="0" i="0">
+                <a:solidFill>
+                  <a:srgbClr val="303141"/>
+                </a:solidFill>
+                <a:effectLst/>
+                <a:latin typeface="Arial" panose="020B0604020202020204" pitchFamily="34" charset="0"/>
+                <a:cs typeface="Arial" panose="020B0604020202020204" pitchFamily="34" charset="0"/>
+              </a:rPr>
+              <a:t> </a:t>
+            </a:r>
+            <a:r>
+              <a:rPr kumimoji="0" lang="en-US" altLang="en-US" sz="1300" b="1" i="0" u="none" strike="noStrike" cap="none" normalizeH="0" baseline="0">
+                <a:ln>
+                  <a:noFill/>
+                </a:ln>
+                <a:solidFill>
+                  <a:schemeClr val="tx1"/>
+                </a:solidFill>
+                <a:effectLst/>
+                <a:latin typeface="Arial" panose="020B0604020202020204" pitchFamily="34" charset="0"/>
+                <a:cs typeface="Arial" panose="020B0604020202020204" pitchFamily="34" charset="0"/>
+              </a:rPr>
+              <a:t>💡 DRY prinsipi ("Don't Repeat Yourself") nədir?</a:t>
+            </a:r>
+            <a:r>
+              <a:rPr kumimoji="0" lang="az-Latn-AZ" altLang="en-US" sz="1300" b="1" i="0" u="none" strike="noStrike" cap="none" normalizeH="0" baseline="0">
+                <a:ln>
+                  <a:noFill/>
+                </a:ln>
+                <a:solidFill>
+                  <a:schemeClr val="tx1"/>
+                </a:solidFill>
+                <a:effectLst/>
+                <a:latin typeface="Arial" panose="020B0604020202020204" pitchFamily="34" charset="0"/>
+                <a:cs typeface="Arial" panose="020B0604020202020204" pitchFamily="34" charset="0"/>
+              </a:rPr>
+              <a:t> - </a:t>
+            </a:r>
+            <a:r>
+              <a:rPr kumimoji="0" lang="en-US" altLang="en-US" sz="1300" b="0" i="0" u="none" strike="noStrike" cap="none" normalizeH="0" baseline="0">
+                <a:ln>
+                  <a:noFill/>
+                </a:ln>
+                <a:solidFill>
+                  <a:schemeClr val="tx1"/>
+                </a:solidFill>
+                <a:effectLst/>
+                <a:latin typeface="Arial" panose="020B0604020202020204" pitchFamily="34" charset="0"/>
+                <a:cs typeface="Arial" panose="020B0604020202020204" pitchFamily="34" charset="0"/>
+              </a:rPr>
+              <a:t>Bu prinsip deyir ki, </a:t>
+            </a:r>
+            <a:r>
+              <a:rPr kumimoji="0" lang="en-US" altLang="en-US" sz="1300" b="1" i="0" u="none" strike="noStrike" cap="none" normalizeH="0" baseline="0">
+                <a:ln>
+                  <a:noFill/>
+                </a:ln>
+                <a:solidFill>
+                  <a:schemeClr val="tx1"/>
+                </a:solidFill>
+                <a:effectLst/>
+                <a:latin typeface="Arial" panose="020B0604020202020204" pitchFamily="34" charset="0"/>
+                <a:cs typeface="Arial" panose="020B0604020202020204" pitchFamily="34" charset="0"/>
+              </a:rPr>
+              <a:t>eyni kodu təkrar yazma</a:t>
+            </a:r>
+            <a:r>
+              <a:rPr kumimoji="0" lang="en-US" altLang="en-US" sz="1300" b="0" i="0" u="none" strike="noStrike" cap="none" normalizeH="0" baseline="0">
+                <a:ln>
+                  <a:noFill/>
+                </a:ln>
+                <a:solidFill>
+                  <a:schemeClr val="tx1"/>
+                </a:solidFill>
+                <a:effectLst/>
+                <a:latin typeface="Arial" panose="020B0604020202020204" pitchFamily="34" charset="0"/>
+                <a:cs typeface="Arial" panose="020B0604020202020204" pitchFamily="34" charset="0"/>
+              </a:rPr>
+              <a:t>. Əvəzində bir dəfə yaz və təkrar istifadə et. Yəni:</a:t>
+            </a:r>
+          </a:p>
+          <a:p>
+            <a:pPr marL="285750" marR="0" lvl="0" indent="-285750" algn="l" defTabSz="914400" rtl="0" eaLnBrk="0" fontAlgn="base" latinLnBrk="0" hangingPunct="0">
+              <a:lnSpc>
+                <a:spcPct val="100000"/>
+              </a:lnSpc>
+              <a:spcBef>
+                <a:spcPct val="0"/>
+              </a:spcBef>
+              <a:spcAft>
+                <a:spcPct val="0"/>
+              </a:spcAft>
+              <a:buClrTx/>
+              <a:buSzTx/>
+              <a:buFont typeface="Arial" panose="020B0604020202020204" pitchFamily="34" charset="0"/>
+              <a:buChar char="•"/>
+              <a:tabLst/>
+            </a:pPr>
+            <a:r>
+              <a:rPr kumimoji="0" lang="en-US" altLang="en-US" sz="1300" b="0" i="0" u="none" strike="noStrike" cap="none" normalizeH="0" baseline="0">
+                <a:ln>
+                  <a:noFill/>
+                </a:ln>
+                <a:solidFill>
+                  <a:schemeClr val="tx1"/>
+                </a:solidFill>
+                <a:effectLst/>
+                <a:latin typeface="Arial" panose="020B0604020202020204" pitchFamily="34" charset="0"/>
+                <a:cs typeface="Arial" panose="020B0604020202020204" pitchFamily="34" charset="0"/>
+              </a:rPr>
+              <a:t>Kod reusable (yenidən istifadə oluna bilən) olmalıdır.</a:t>
+            </a:r>
+          </a:p>
+          <a:p>
+            <a:pPr marL="285750" marR="0" lvl="0" indent="-285750" algn="l" defTabSz="914400" rtl="0" eaLnBrk="0" fontAlgn="base" latinLnBrk="0" hangingPunct="0">
+              <a:lnSpc>
+                <a:spcPct val="100000"/>
+              </a:lnSpc>
+              <a:spcBef>
+                <a:spcPct val="0"/>
+              </a:spcBef>
+              <a:spcAft>
+                <a:spcPct val="0"/>
+              </a:spcAft>
+              <a:buClrTx/>
+              <a:buSzTx/>
+              <a:buFont typeface="Arial" panose="020B0604020202020204" pitchFamily="34" charset="0"/>
+              <a:buChar char="•"/>
+              <a:tabLst/>
+            </a:pPr>
+            <a:r>
+              <a:rPr kumimoji="0" lang="en-US" altLang="en-US" sz="1300" b="0" i="0" u="none" strike="noStrike" cap="none" normalizeH="0" baseline="0">
+                <a:ln>
+                  <a:noFill/>
+                </a:ln>
+                <a:solidFill>
+                  <a:schemeClr val="tx1"/>
+                </a:solidFill>
+                <a:effectLst/>
+                <a:latin typeface="Arial" panose="020B0604020202020204" pitchFamily="34" charset="0"/>
+                <a:cs typeface="Arial" panose="020B0604020202020204" pitchFamily="34" charset="0"/>
+              </a:rPr>
+              <a:t>Məsələn, Button.vue və ya ProductCard.jsx komponentlərini yarat və onları lazım olduqca çağır.</a:t>
+            </a:r>
+          </a:p>
+          <a:p>
+            <a:pPr marL="0" marR="0" lvl="0" indent="0" algn="l" defTabSz="914400" rtl="0" eaLnBrk="0" fontAlgn="base" latinLnBrk="0" hangingPunct="0">
+              <a:lnSpc>
+                <a:spcPct val="100000"/>
+              </a:lnSpc>
+              <a:spcBef>
+                <a:spcPct val="0"/>
+              </a:spcBef>
+              <a:spcAft>
+                <a:spcPct val="0"/>
+              </a:spcAft>
+              <a:buClrTx/>
+              <a:buSzTx/>
+              <a:buFontTx/>
+              <a:buNone/>
+              <a:tabLst/>
+            </a:pPr>
+            <a:endParaRPr kumimoji="0" lang="en-US" altLang="en-US" sz="1300" b="0" i="0" u="none" strike="noStrike" cap="none" normalizeH="0" baseline="0">
+              <a:ln>
+                <a:noFill/>
+              </a:ln>
+              <a:solidFill>
+                <a:schemeClr val="tx1"/>
+              </a:solidFill>
+              <a:effectLst/>
+              <a:latin typeface="Arial" panose="020B0604020202020204" pitchFamily="34" charset="0"/>
+              <a:cs typeface="Arial" panose="020B0604020202020204" pitchFamily="34" charset="0"/>
+            </a:endParaRPr>
+          </a:p>
+          <a:p>
+            <a:pPr>
+              <a:buNone/>
+            </a:pPr>
+            <a:endParaRPr lang="az-Latn-AZ" sz="1300" b="0" i="0">
+              <a:solidFill>
+                <a:srgbClr val="303141"/>
+              </a:solidFill>
+              <a:effectLst/>
+              <a:latin typeface="Arial" panose="020B0604020202020204" pitchFamily="34" charset="0"/>
+              <a:cs typeface="Arial" panose="020B0604020202020204" pitchFamily="34" charset="0"/>
+            </a:endParaRPr>
+          </a:p>
+          <a:p>
+            <a:pPr>
+              <a:buNone/>
+            </a:pPr>
+            <a:endParaRPr lang="az-Latn-AZ" sz="1300">
+              <a:solidFill>
+                <a:srgbClr val="303141"/>
+              </a:solidFill>
+              <a:latin typeface="Arial" panose="020B0604020202020204" pitchFamily="34" charset="0"/>
+              <a:cs typeface="Arial" panose="020B0604020202020204" pitchFamily="34" charset="0"/>
+            </a:endParaRPr>
+          </a:p>
+          <a:p>
+            <a:pPr>
+              <a:buNone/>
+            </a:pPr>
+            <a:endParaRPr lang="az-Latn-AZ" sz="1300" b="1">
+              <a:solidFill>
+                <a:srgbClr val="303141"/>
+              </a:solidFill>
+              <a:latin typeface="Arial" panose="020B0604020202020204" pitchFamily="34" charset="0"/>
+              <a:cs typeface="Arial" panose="020B0604020202020204" pitchFamily="34" charset="0"/>
+            </a:endParaRPr>
+          </a:p>
+          <a:p>
+            <a:pPr>
+              <a:buNone/>
+            </a:pPr>
+            <a:r>
+              <a:rPr lang="en-US" sz="1300" b="1">
+                <a:latin typeface="Arial" panose="020B0604020202020204" pitchFamily="34" charset="0"/>
+                <a:cs typeface="Arial" panose="020B0604020202020204" pitchFamily="34" charset="0"/>
+              </a:rPr>
+              <a:t>🔷 10. Ümumi Uyğunluq və Performans</a:t>
+            </a:r>
+          </a:p>
+          <a:p>
+            <a:pPr marL="285750" indent="-285750">
+              <a:buFont typeface="Arial" panose="020B0604020202020204" pitchFamily="34" charset="0"/>
+              <a:buChar char="•"/>
+            </a:pPr>
+            <a:r>
+              <a:rPr lang="en-US" sz="1300">
+                <a:latin typeface="Arial" panose="020B0604020202020204" pitchFamily="34" charset="0"/>
+                <a:cs typeface="Arial" panose="020B0604020202020204" pitchFamily="34" charset="0"/>
+              </a:rPr>
+              <a:t>Figma dizaynında göstərilən animasiyalar (slide, fade-in, hover transitions) işləyirmi?</a:t>
+            </a:r>
+          </a:p>
+          <a:p>
+            <a:pPr marL="285750" indent="-285750">
+              <a:buFont typeface="Arial" panose="020B0604020202020204" pitchFamily="34" charset="0"/>
+              <a:buChar char="•"/>
+            </a:pPr>
+            <a:r>
+              <a:rPr lang="en-US" sz="1300">
+                <a:latin typeface="Arial" panose="020B0604020202020204" pitchFamily="34" charset="0"/>
+                <a:cs typeface="Arial" panose="020B0604020202020204" pitchFamily="34" charset="0"/>
+              </a:rPr>
+              <a:t>Performance yükü yoxlanıb? Ağır elementlər render zamanı sistemə yük salırmı?</a:t>
+            </a:r>
+          </a:p>
+          <a:p>
+            <a:pPr algn="l"/>
+            <a:endParaRPr lang="ru-RU" sz="1300" b="0" i="0">
+              <a:solidFill>
+                <a:srgbClr val="303141"/>
+              </a:solidFill>
+              <a:effectLst/>
+              <a:latin typeface="Arial" panose="020B0604020202020204" pitchFamily="34" charset="0"/>
+              <a:cs typeface="Arial" panose="020B0604020202020204" pitchFamily="34" charset="0"/>
+            </a:endParaRPr>
+          </a:p>
+        </p:txBody>
+      </p:sp>
+    </p:spTree>
+    <p:extLst>
+      <p:ext uri="{BB962C8B-B14F-4D97-AF65-F5344CB8AC3E}">
+        <p14:creationId xmlns:p14="http://schemas.microsoft.com/office/powerpoint/2010/main" val="566973124"/>
+      </p:ext>
+    </p:extLst>
+  </p:cSld>
+  <p:clrMapOvr>
+    <a:masterClrMapping/>
+  </p:clrMapOvr>
+</p:sld>
+</file>
+
+<file path=ppt/slides/slide12.xml><?xml version="1.0" encoding="utf-8"?>
+<p:sld xmlns:a="http://schemas.openxmlformats.org/drawingml/2006/main" xmlns:r="http://schemas.openxmlformats.org/officeDocument/2006/relationships" xmlns:p="http://schemas.openxmlformats.org/presentationml/2006/main">
+  <p:cSld>
+    <p:spTree>
+      <p:nvGrpSpPr>
+        <p:cNvPr id="1" name="">
+          <a:extLst>
+            <a:ext uri="{FF2B5EF4-FFF2-40B4-BE49-F238E27FC236}">
+              <a16:creationId xmlns:a16="http://schemas.microsoft.com/office/drawing/2014/main" id="{87402FB8-DDF2-3F9E-4AC9-B41EC1A9E370}"/>
+            </a:ext>
+          </a:extLst>
+        </p:cNvPr>
+        <p:cNvGrpSpPr/>
+        <p:nvPr/>
+      </p:nvGrpSpPr>
+      <p:grpSpPr>
+        <a:xfrm>
+          <a:off x="0" y="0"/>
+          <a:ext cx="0" cy="0"/>
+          <a:chOff x="0" y="0"/>
+          <a:chExt cx="0" cy="0"/>
+        </a:xfrm>
+      </p:grpSpPr>
+      <p:sp>
+        <p:nvSpPr>
+          <p:cNvPr id="3" name="TextBox 2">
+            <a:extLst>
+              <a:ext uri="{FF2B5EF4-FFF2-40B4-BE49-F238E27FC236}">
+                <a16:creationId xmlns:a16="http://schemas.microsoft.com/office/drawing/2014/main" id="{C50E21F5-D2A6-6C42-A70A-16764E39744E}"/>
+              </a:ext>
+            </a:extLst>
+          </p:cNvPr>
+          <p:cNvSpPr txBox="1"/>
+          <p:nvPr/>
+        </p:nvSpPr>
+        <p:spPr>
+          <a:xfrm>
+            <a:off x="107004" y="158874"/>
+            <a:ext cx="11984477" cy="338554"/>
+          </a:xfrm>
+          <a:prstGeom prst="rect">
+            <a:avLst/>
+          </a:prstGeom>
+          <a:noFill/>
+        </p:spPr>
+        <p:txBody>
+          <a:bodyPr wrap="square">
+            <a:spAutoFit/>
+          </a:bodyPr>
+          <a:lstStyle/>
+          <a:p>
+            <a:pPr algn="l"/>
+            <a:r>
+              <a:rPr lang="ru-RU" sz="1600" b="0" i="0">
+                <a:solidFill>
+                  <a:srgbClr val="303141"/>
+                </a:solidFill>
+                <a:effectLst/>
+                <a:latin typeface="Udemy Sans"/>
+              </a:rPr>
+              <a:t> </a:t>
+            </a:r>
+          </a:p>
+        </p:txBody>
+      </p:sp>
+    </p:spTree>
+    <p:extLst>
+      <p:ext uri="{BB962C8B-B14F-4D97-AF65-F5344CB8AC3E}">
+        <p14:creationId xmlns:p14="http://schemas.microsoft.com/office/powerpoint/2010/main" val="369046241"/>
+      </p:ext>
+    </p:extLst>
+  </p:cSld>
+  <p:clrMapOvr>
+    <a:masterClrMapping/>
+  </p:clrMapOvr>
+</p:sld>
+</file>
+
+<file path=ppt/slides/slide13.xml><?xml version="1.0" encoding="utf-8"?>
+<p:sld xmlns:a="http://schemas.openxmlformats.org/drawingml/2006/main" xmlns:r="http://schemas.openxmlformats.org/officeDocument/2006/relationships" xmlns:p="http://schemas.openxmlformats.org/presentationml/2006/main">
+  <p:cSld>
+    <p:spTree>
+      <p:nvGrpSpPr>
+        <p:cNvPr id="1" name="">
+          <a:extLst>
+            <a:ext uri="{FF2B5EF4-FFF2-40B4-BE49-F238E27FC236}">
+              <a16:creationId xmlns:a16="http://schemas.microsoft.com/office/drawing/2014/main" id="{215759FA-594C-8065-74E9-AEAA8631FF3F}"/>
+            </a:ext>
+          </a:extLst>
+        </p:cNvPr>
+        <p:cNvGrpSpPr/>
+        <p:nvPr/>
+      </p:nvGrpSpPr>
+      <p:grpSpPr>
+        <a:xfrm>
+          <a:off x="0" y="0"/>
+          <a:ext cx="0" cy="0"/>
+          <a:chOff x="0" y="0"/>
+          <a:chExt cx="0" cy="0"/>
+        </a:xfrm>
+      </p:grpSpPr>
+      <p:sp>
+        <p:nvSpPr>
+          <p:cNvPr id="3" name="TextBox 2">
+            <a:extLst>
+              <a:ext uri="{FF2B5EF4-FFF2-40B4-BE49-F238E27FC236}">
+                <a16:creationId xmlns:a16="http://schemas.microsoft.com/office/drawing/2014/main" id="{4705FEED-6269-B098-D192-DF5F177BA175}"/>
+              </a:ext>
+            </a:extLst>
+          </p:cNvPr>
+          <p:cNvSpPr txBox="1"/>
+          <p:nvPr/>
+        </p:nvSpPr>
+        <p:spPr>
+          <a:xfrm>
+            <a:off x="107004" y="158874"/>
+            <a:ext cx="11984477" cy="338554"/>
+          </a:xfrm>
+          <a:prstGeom prst="rect">
+            <a:avLst/>
+          </a:prstGeom>
+          <a:noFill/>
+        </p:spPr>
+        <p:txBody>
+          <a:bodyPr wrap="square">
+            <a:spAutoFit/>
+          </a:bodyPr>
+          <a:lstStyle/>
+          <a:p>
+            <a:pPr algn="l"/>
+            <a:r>
+              <a:rPr lang="ru-RU" sz="1600" b="0" i="0">
+                <a:solidFill>
+                  <a:srgbClr val="303141"/>
+                </a:solidFill>
+                <a:effectLst/>
+                <a:latin typeface="Udemy Sans"/>
+              </a:rPr>
+              <a:t> </a:t>
+            </a:r>
+          </a:p>
+        </p:txBody>
+      </p:sp>
+    </p:spTree>
+    <p:extLst>
+      <p:ext uri="{BB962C8B-B14F-4D97-AF65-F5344CB8AC3E}">
+        <p14:creationId xmlns:p14="http://schemas.microsoft.com/office/powerpoint/2010/main" val="4268592108"/>
+      </p:ext>
+    </p:extLst>
+  </p:cSld>
+  <p:clrMapOvr>
+    <a:masterClrMapping/>
+  </p:clrMapOvr>
+</p:sld>
+</file>
+
+<file path=ppt/slides/slide14.xml><?xml version="1.0" encoding="utf-8"?>
 <p:sld xmlns:a="http://schemas.openxmlformats.org/drawingml/2006/main" xmlns:r="http://schemas.openxmlformats.org/officeDocument/2006/relationships" xmlns:p="http://schemas.openxmlformats.org/presentationml/2006/main">
   <p:cSld>
     <p:spTree>
@@ -8240,7 +9655,7 @@
         <p:spPr>
           <a:xfrm>
             <a:off x="107004" y="158874"/>
-            <a:ext cx="11984477" cy="338554"/>
+            <a:ext cx="11984477" cy="5509200"/>
           </a:xfrm>
           <a:prstGeom prst="rect">
             <a:avLst/>
@@ -8255,15 +9670,316 @@
           <a:p>
             <a:pPr algn="l"/>
             <a:r>
-              <a:rPr lang="ru-RU" sz="1600" b="0" i="0">
-                <a:solidFill>
-                  <a:srgbClr val="303141"/>
+              <a:rPr lang="ru-RU" sz="1600" b="1" i="0">
+                <a:solidFill>
+                  <a:srgbClr val="FF0000"/>
                 </a:solidFill>
                 <a:effectLst/>
                 <a:latin typeface="Udemy Sans"/>
               </a:rPr>
               <a:t> </a:t>
             </a:r>
+            <a:r>
+              <a:rPr lang="en-US" sz="1600" b="1">
+                <a:solidFill>
+                  <a:srgbClr val="FF0000"/>
+                </a:solidFill>
+              </a:rPr>
+              <a:t>Figma üzərində hazırlanmış web GUI maket</a:t>
+            </a:r>
+            <a:r>
+              <a:rPr lang="az-Latn-AZ" sz="1600" b="1">
+                <a:solidFill>
+                  <a:srgbClr val="FF0000"/>
+                </a:solidFill>
+              </a:rPr>
+              <a:t>i yoxlayarakən </a:t>
+            </a:r>
+            <a:r>
+              <a:rPr lang="en-US" sz="1600" b="1">
+                <a:solidFill>
+                  <a:srgbClr val="FF0000"/>
+                </a:solidFill>
+              </a:rPr>
+              <a:t>QA tester-in əsas məqsədi UI dizaynının development versiyası ilə nə qədər uyğun olub-olmadığını yoxlamaqdır.</a:t>
+            </a:r>
+            <a:endParaRPr lang="az-Latn-AZ" sz="1600" b="1">
+              <a:solidFill>
+                <a:srgbClr val="FF0000"/>
+              </a:solidFill>
+            </a:endParaRPr>
+          </a:p>
+          <a:p>
+            <a:pPr algn="l"/>
+            <a:endParaRPr lang="az-Latn-AZ" sz="1600" b="1" i="0">
+              <a:solidFill>
+                <a:srgbClr val="FF0000"/>
+              </a:solidFill>
+              <a:effectLst/>
+              <a:latin typeface="Udemy Sans"/>
+            </a:endParaRPr>
+          </a:p>
+          <a:p>
+            <a:pPr algn="l"/>
+            <a:endParaRPr lang="az-Latn-AZ" sz="1600" b="1">
+              <a:solidFill>
+                <a:srgbClr val="FF0000"/>
+              </a:solidFill>
+              <a:latin typeface="Udemy Sans"/>
+            </a:endParaRPr>
+          </a:p>
+          <a:p>
+            <a:pPr>
+              <a:buNone/>
+            </a:pPr>
+            <a:r>
+              <a:rPr lang="en-US" sz="1600"/>
+              <a:t>Burada test əsasən </a:t>
+            </a:r>
+            <a:r>
+              <a:rPr lang="en-US" sz="1600" b="1"/>
+              <a:t>vizual fərqlər</a:t>
+            </a:r>
+            <a:r>
+              <a:rPr lang="en-US" sz="1600"/>
+              <a:t>, </a:t>
+            </a:r>
+            <a:r>
+              <a:rPr lang="en-US" sz="1600" b="1"/>
+              <a:t>komponentlərin mövqeləri</a:t>
+            </a:r>
+            <a:r>
+              <a:rPr lang="en-US" sz="1600"/>
+              <a:t>, </a:t>
+            </a:r>
+            <a:r>
+              <a:rPr lang="en-US" sz="1600" b="1"/>
+              <a:t>stil</a:t>
+            </a:r>
+            <a:r>
+              <a:rPr lang="en-US" sz="1600"/>
+              <a:t>, və </a:t>
+            </a:r>
+            <a:r>
+              <a:rPr lang="en-US" sz="1600" b="1"/>
+              <a:t>funksional gözləntilər</a:t>
+            </a:r>
+            <a:r>
+              <a:rPr lang="en-US" sz="1600"/>
+              <a:t> üzrə aparılır.</a:t>
+            </a:r>
+            <a:r>
+              <a:rPr lang="az-Latn-AZ" sz="1600"/>
+              <a:t> </a:t>
+            </a:r>
+            <a:r>
+              <a:rPr lang="en-US" sz="1600"/>
+              <a:t>Aşağıda </a:t>
+            </a:r>
+            <a:r>
+              <a:rPr lang="en-US" sz="1600" b="1"/>
+              <a:t>Figma maket əsasında QA test edərkən diqqət etməli olduğun əsas sahələri və konkret yoxlama ssenarilərini</a:t>
+            </a:r>
+            <a:r>
+              <a:rPr lang="en-US" sz="1600"/>
+              <a:t> sadalayıram.</a:t>
+            </a:r>
+          </a:p>
+          <a:p>
+            <a:pPr algn="l"/>
+            <a:endParaRPr lang="az-Latn-AZ" sz="1600" b="1" i="0">
+              <a:solidFill>
+                <a:srgbClr val="FF0000"/>
+              </a:solidFill>
+              <a:effectLst/>
+              <a:latin typeface="Udemy Sans"/>
+            </a:endParaRPr>
+          </a:p>
+          <a:p>
+            <a:pPr algn="l"/>
+            <a:endParaRPr lang="az-Latn-AZ" sz="1600" b="1">
+              <a:solidFill>
+                <a:srgbClr val="FF0000"/>
+              </a:solidFill>
+              <a:latin typeface="Udemy Sans"/>
+            </a:endParaRPr>
+          </a:p>
+          <a:p>
+            <a:pPr algn="l"/>
+            <a:endParaRPr lang="az-Latn-AZ" sz="1600" b="1" i="0">
+              <a:solidFill>
+                <a:srgbClr val="FF0000"/>
+              </a:solidFill>
+              <a:effectLst/>
+              <a:latin typeface="Udemy Sans"/>
+            </a:endParaRPr>
+          </a:p>
+          <a:p>
+            <a:pPr algn="l"/>
+            <a:r>
+              <a:rPr lang="en-US" sz="1600"/>
+              <a:t>✅ </a:t>
+            </a:r>
+            <a:r>
+              <a:rPr lang="en-US" sz="1600" b="1"/>
+              <a:t>Figma əsaslı Web GUI Test Checklist</a:t>
+            </a:r>
+            <a:endParaRPr lang="az-Latn-AZ" sz="1600" b="1"/>
+          </a:p>
+          <a:p>
+            <a:pPr algn="l"/>
+            <a:endParaRPr lang="az-Latn-AZ" sz="1600" b="1"/>
+          </a:p>
+          <a:p>
+            <a:pPr>
+              <a:buNone/>
+            </a:pPr>
+            <a:r>
+              <a:rPr lang="en-US" sz="1600" b="1"/>
+              <a:t>🔷 1. Pixel-Perfect Uyğunluq</a:t>
+            </a:r>
+            <a:endParaRPr lang="az-Latn-AZ" sz="1600" b="1"/>
+          </a:p>
+          <a:p>
+            <a:pPr>
+              <a:buNone/>
+            </a:pPr>
+            <a:endParaRPr lang="en-US" sz="1600" b="1"/>
+          </a:p>
+          <a:p>
+            <a:pPr>
+              <a:buNone/>
+            </a:pPr>
+            <a:r>
+              <a:rPr lang="en-US" sz="1600" b="1"/>
+              <a:t>Nələr edilməlidir:</a:t>
+            </a:r>
+          </a:p>
+          <a:p>
+            <a:pPr marL="285750" indent="-285750">
+              <a:buFont typeface="Arial" panose="020B0604020202020204" pitchFamily="34" charset="0"/>
+              <a:buChar char="•"/>
+            </a:pPr>
+            <a:r>
+              <a:rPr lang="en-US" sz="1600"/>
+              <a:t>Development versiyası ilə Figma maketi yanyana qoyaraq </a:t>
+            </a:r>
+            <a:r>
+              <a:rPr lang="en-US" sz="1600" b="1"/>
+              <a:t>piksel fərqləri</a:t>
+            </a:r>
+            <a:r>
+              <a:rPr lang="en-US" sz="1600"/>
+              <a:t> axtar</a:t>
+            </a:r>
+            <a:r>
+              <a:rPr lang="az-Latn-AZ" sz="1600"/>
+              <a:t>. Yəni developer maket ölçülərinə əsaslanaraqmı yığıb.</a:t>
+            </a:r>
+            <a:endParaRPr lang="en-US" sz="1600"/>
+          </a:p>
+          <a:p>
+            <a:pPr marL="285750" indent="-285750">
+              <a:buFont typeface="Arial" panose="020B0604020202020204" pitchFamily="34" charset="0"/>
+              <a:buChar char="•"/>
+            </a:pPr>
+            <a:r>
+              <a:rPr lang="en-US" sz="1600" b="1"/>
+              <a:t>Spacing</a:t>
+            </a:r>
+            <a:r>
+              <a:rPr lang="en-US" sz="1600"/>
+              <a:t>, </a:t>
+            </a:r>
+            <a:r>
+              <a:rPr lang="en-US" sz="1600" b="1"/>
+              <a:t>padding</a:t>
+            </a:r>
+            <a:r>
+              <a:rPr lang="en-US" sz="1600"/>
+              <a:t>, </a:t>
+            </a:r>
+            <a:r>
+              <a:rPr lang="en-US" sz="1600" b="1"/>
+              <a:t>margin</a:t>
+            </a:r>
+            <a:r>
+              <a:rPr lang="en-US" sz="1600"/>
+              <a:t> ölçüləri ilə Figma-nın uyğunluğunu yoxla</a:t>
+            </a:r>
+          </a:p>
+          <a:p>
+            <a:pPr marL="285750" indent="-285750">
+              <a:buFont typeface="Arial" panose="020B0604020202020204" pitchFamily="34" charset="0"/>
+              <a:buChar char="•"/>
+            </a:pPr>
+            <a:r>
+              <a:rPr lang="en-US" sz="1600"/>
+              <a:t>Bütün komponentlər (card, button, input və s.) Figma ölçüləri ilə eyni ölçüdədirmi?</a:t>
+            </a:r>
+            <a:endParaRPr lang="az-Latn-AZ" sz="1600"/>
+          </a:p>
+          <a:p>
+            <a:pPr marL="285750" indent="-285750">
+              <a:buFont typeface="Arial" panose="020B0604020202020204" pitchFamily="34" charset="0"/>
+              <a:buChar char="•"/>
+            </a:pPr>
+            <a:endParaRPr lang="en-US" sz="1600"/>
+          </a:p>
+          <a:p>
+            <a:pPr>
+              <a:buNone/>
+            </a:pPr>
+            <a:r>
+              <a:rPr lang="en-US" sz="1600" b="1"/>
+              <a:t>Alətlər:</a:t>
+            </a:r>
+          </a:p>
+          <a:p>
+            <a:pPr marL="285750" indent="-285750">
+              <a:buFont typeface="Arial" panose="020B0604020202020204" pitchFamily="34" charset="0"/>
+              <a:buChar char="•"/>
+            </a:pPr>
+            <a:r>
+              <a:rPr lang="en-US" sz="1600"/>
+              <a:t>Figma'nın "Inspect" panelindən ölçü və rəng kodlarını götür</a:t>
+            </a:r>
+          </a:p>
+          <a:p>
+            <a:pPr marL="285750" indent="-285750">
+              <a:buFont typeface="Arial" panose="020B0604020202020204" pitchFamily="34" charset="0"/>
+              <a:buChar char="•"/>
+            </a:pPr>
+            <a:r>
+              <a:rPr lang="en-US" sz="1600"/>
+              <a:t>Chrome Extension: </a:t>
+            </a:r>
+            <a:r>
+              <a:rPr lang="en-US" sz="1600" b="1"/>
+              <a:t>Pixel Perfect</a:t>
+            </a:r>
+            <a:r>
+              <a:rPr lang="en-US" sz="1600"/>
+              <a:t>, </a:t>
+            </a:r>
+            <a:r>
+              <a:rPr lang="en-US" sz="1600" b="1"/>
+              <a:t>PerfectPixel</a:t>
+            </a:r>
+            <a:r>
+              <a:rPr lang="en-US" sz="1600"/>
+              <a:t> – şəffaf Figma layer overlay etmək üçün</a:t>
+            </a:r>
+          </a:p>
+          <a:p>
+            <a:pPr algn="l"/>
+            <a:endParaRPr lang="ru-RU" sz="1600" b="1" i="0">
+              <a:solidFill>
+                <a:srgbClr val="FF0000"/>
+              </a:solidFill>
+              <a:effectLst/>
+              <a:latin typeface="Udemy Sans"/>
+            </a:endParaRPr>
           </a:p>
         </p:txBody>
       </p:sp>
@@ -8318,7 +10034,7 @@
         <p:spPr>
           <a:xfrm>
             <a:off x="107004" y="158874"/>
-            <a:ext cx="11984477" cy="338554"/>
+            <a:ext cx="11984477" cy="6186309"/>
           </a:xfrm>
           <a:prstGeom prst="rect">
             <a:avLst/>
@@ -8331,16 +10047,771 @@
           </a:bodyPr>
           <a:lstStyle/>
           <a:p>
+            <a:pPr marL="0" marR="0" lvl="0" indent="0" algn="l" defTabSz="914400" rtl="0" eaLnBrk="0" fontAlgn="base" latinLnBrk="0" hangingPunct="0">
+              <a:lnSpc>
+                <a:spcPct val="100000"/>
+              </a:lnSpc>
+              <a:spcBef>
+                <a:spcPct val="0"/>
+              </a:spcBef>
+              <a:spcAft>
+                <a:spcPct val="0"/>
+              </a:spcAft>
+              <a:buClrTx/>
+              <a:buSzTx/>
+              <a:buFontTx/>
+              <a:buNone/>
+              <a:tabLst/>
+            </a:pPr>
+            <a:r>
+              <a:rPr lang="ru-RU" sz="1200" b="0" i="0">
+                <a:solidFill>
+                  <a:srgbClr val="303141"/>
+                </a:solidFill>
+                <a:effectLst/>
+                <a:latin typeface="Arial" panose="020B0604020202020204" pitchFamily="34" charset="0"/>
+                <a:cs typeface="Arial" panose="020B0604020202020204" pitchFamily="34" charset="0"/>
+              </a:rPr>
+              <a:t> </a:t>
+            </a:r>
+            <a:r>
+              <a:rPr kumimoji="0" lang="en-US" altLang="en-US" sz="1200" b="1" i="0" u="none" strike="noStrike" cap="none" normalizeH="0" baseline="0">
+                <a:ln>
+                  <a:noFill/>
+                </a:ln>
+                <a:solidFill>
+                  <a:schemeClr val="tx1"/>
+                </a:solidFill>
+                <a:effectLst/>
+                <a:latin typeface="Arial" panose="020B0604020202020204" pitchFamily="34" charset="0"/>
+                <a:cs typeface="Arial" panose="020B0604020202020204" pitchFamily="34" charset="0"/>
+              </a:rPr>
+              <a:t>🔷 2. Typography Uyğunluğu</a:t>
+            </a:r>
+          </a:p>
+          <a:p>
+            <a:pPr marL="0" marR="0" lvl="0" indent="0" algn="l" defTabSz="914400" rtl="0" eaLnBrk="0" fontAlgn="base" latinLnBrk="0" hangingPunct="0">
+              <a:lnSpc>
+                <a:spcPct val="100000"/>
+              </a:lnSpc>
+              <a:spcBef>
+                <a:spcPct val="0"/>
+              </a:spcBef>
+              <a:spcAft>
+                <a:spcPct val="0"/>
+              </a:spcAft>
+              <a:buClrTx/>
+              <a:buSzTx/>
+              <a:buFontTx/>
+              <a:buNone/>
+              <a:tabLst/>
+            </a:pPr>
+            <a:r>
+              <a:rPr kumimoji="0" lang="en-US" altLang="en-US" sz="1200" b="1" i="0" u="none" strike="noStrike" cap="none" normalizeH="0" baseline="0">
+                <a:ln>
+                  <a:noFill/>
+                </a:ln>
+                <a:solidFill>
+                  <a:schemeClr val="tx1"/>
+                </a:solidFill>
+                <a:effectLst/>
+                <a:latin typeface="Arial" panose="020B0604020202020204" pitchFamily="34" charset="0"/>
+                <a:cs typeface="Arial" panose="020B0604020202020204" pitchFamily="34" charset="0"/>
+              </a:rPr>
+              <a:t>Yoxla:</a:t>
+            </a:r>
+          </a:p>
+          <a:p>
+            <a:pPr marL="285750" marR="0" lvl="0" indent="-285750" algn="l" defTabSz="914400" rtl="0" eaLnBrk="0" fontAlgn="base" latinLnBrk="0" hangingPunct="0">
+              <a:lnSpc>
+                <a:spcPct val="100000"/>
+              </a:lnSpc>
+              <a:spcBef>
+                <a:spcPct val="0"/>
+              </a:spcBef>
+              <a:spcAft>
+                <a:spcPct val="0"/>
+              </a:spcAft>
+              <a:buClrTx/>
+              <a:buSzTx/>
+              <a:buFont typeface="Arial" panose="020B0604020202020204" pitchFamily="34" charset="0"/>
+              <a:buChar char="•"/>
+              <a:tabLst/>
+            </a:pPr>
+            <a:r>
+              <a:rPr kumimoji="0" lang="en-US" altLang="en-US" sz="1200" b="0" i="0" u="none" strike="noStrike" cap="none" normalizeH="0" baseline="0">
+                <a:ln>
+                  <a:noFill/>
+                </a:ln>
+                <a:solidFill>
+                  <a:schemeClr val="tx1"/>
+                </a:solidFill>
+                <a:effectLst/>
+                <a:latin typeface="Arial" panose="020B0604020202020204" pitchFamily="34" charset="0"/>
+                <a:cs typeface="Arial" panose="020B0604020202020204" pitchFamily="34" charset="0"/>
+              </a:rPr>
+              <a:t>Font növü (family), ölçüsü (font-size), çəkisi (font-weight), line-height</a:t>
+            </a:r>
+          </a:p>
+          <a:p>
+            <a:pPr marL="285750" marR="0" lvl="0" indent="-285750" algn="l" defTabSz="914400" rtl="0" eaLnBrk="0" fontAlgn="base" latinLnBrk="0" hangingPunct="0">
+              <a:lnSpc>
+                <a:spcPct val="100000"/>
+              </a:lnSpc>
+              <a:spcBef>
+                <a:spcPct val="0"/>
+              </a:spcBef>
+              <a:spcAft>
+                <a:spcPct val="0"/>
+              </a:spcAft>
+              <a:buClrTx/>
+              <a:buSzTx/>
+              <a:buFont typeface="Arial" panose="020B0604020202020204" pitchFamily="34" charset="0"/>
+              <a:buChar char="•"/>
+              <a:tabLst/>
+            </a:pPr>
+            <a:r>
+              <a:rPr kumimoji="0" lang="en-US" altLang="en-US" sz="1200" b="0" i="0" u="none" strike="noStrike" cap="none" normalizeH="0" baseline="0">
+                <a:ln>
+                  <a:noFill/>
+                </a:ln>
+                <a:solidFill>
+                  <a:schemeClr val="tx1"/>
+                </a:solidFill>
+                <a:effectLst/>
+                <a:latin typeface="Arial" panose="020B0604020202020204" pitchFamily="34" charset="0"/>
+                <a:cs typeface="Arial" panose="020B0604020202020204" pitchFamily="34" charset="0"/>
+              </a:rPr>
+              <a:t>Başlıqlar (H1, H2…), bədən mətnləri və linklərin stil fərqləri</a:t>
+            </a:r>
+          </a:p>
+          <a:p>
+            <a:pPr marL="0" marR="0" lvl="0" indent="0" algn="l" defTabSz="914400" rtl="0" eaLnBrk="0" fontAlgn="base" latinLnBrk="0" hangingPunct="0">
+              <a:lnSpc>
+                <a:spcPct val="100000"/>
+              </a:lnSpc>
+              <a:spcBef>
+                <a:spcPct val="0"/>
+              </a:spcBef>
+              <a:spcAft>
+                <a:spcPct val="0"/>
+              </a:spcAft>
+              <a:buClrTx/>
+              <a:buSzTx/>
+              <a:buFontTx/>
+              <a:buNone/>
+              <a:tabLst/>
+            </a:pPr>
+            <a:endParaRPr kumimoji="0" lang="en-US" altLang="en-US" sz="1200" b="0" i="0" u="none" strike="noStrike" cap="none" normalizeH="0" baseline="0">
+              <a:ln>
+                <a:noFill/>
+              </a:ln>
+              <a:solidFill>
+                <a:schemeClr val="tx1"/>
+              </a:solidFill>
+              <a:effectLst/>
+              <a:latin typeface="Arial" panose="020B0604020202020204" pitchFamily="34" charset="0"/>
+              <a:cs typeface="Arial" panose="020B0604020202020204" pitchFamily="34" charset="0"/>
+            </a:endParaRPr>
+          </a:p>
+          <a:p>
             <a:pPr algn="l"/>
-            <a:r>
-              <a:rPr lang="ru-RU" sz="1600" b="0" i="0">
-                <a:solidFill>
-                  <a:srgbClr val="303141"/>
+            <a:endParaRPr lang="az-Latn-AZ" sz="1200" b="0" i="0">
+              <a:solidFill>
+                <a:srgbClr val="303141"/>
+              </a:solidFill>
+              <a:effectLst/>
+              <a:latin typeface="Arial" panose="020B0604020202020204" pitchFamily="34" charset="0"/>
+              <a:cs typeface="Arial" panose="020B0604020202020204" pitchFamily="34" charset="0"/>
+            </a:endParaRPr>
+          </a:p>
+          <a:p>
+            <a:pPr algn="l"/>
+            <a:endParaRPr lang="az-Latn-AZ" sz="1200">
+              <a:solidFill>
+                <a:srgbClr val="303141"/>
+              </a:solidFill>
+              <a:latin typeface="Arial" panose="020B0604020202020204" pitchFamily="34" charset="0"/>
+              <a:cs typeface="Arial" panose="020B0604020202020204" pitchFamily="34" charset="0"/>
+            </a:endParaRPr>
+          </a:p>
+          <a:p>
+            <a:pPr algn="l"/>
+            <a:endParaRPr lang="az-Latn-AZ" sz="1200">
+              <a:solidFill>
+                <a:srgbClr val="303141"/>
+              </a:solidFill>
+              <a:latin typeface="Arial" panose="020B0604020202020204" pitchFamily="34" charset="0"/>
+              <a:cs typeface="Arial" panose="020B0604020202020204" pitchFamily="34" charset="0"/>
+            </a:endParaRPr>
+          </a:p>
+          <a:p>
+            <a:pPr marL="0" marR="0" lvl="0" indent="0" algn="l" defTabSz="914400" rtl="0" eaLnBrk="0" fontAlgn="base" latinLnBrk="0" hangingPunct="0">
+              <a:lnSpc>
+                <a:spcPct val="100000"/>
+              </a:lnSpc>
+              <a:spcBef>
+                <a:spcPct val="0"/>
+              </a:spcBef>
+              <a:spcAft>
+                <a:spcPct val="0"/>
+              </a:spcAft>
+              <a:buClrTx/>
+              <a:buSzTx/>
+              <a:buFontTx/>
+              <a:buNone/>
+              <a:tabLst/>
+            </a:pPr>
+            <a:r>
+              <a:rPr kumimoji="0" lang="en-US" altLang="en-US" sz="1200" b="1" i="0" u="none" strike="noStrike" cap="none" normalizeH="0" baseline="0">
+                <a:ln>
+                  <a:noFill/>
+                </a:ln>
+                <a:solidFill>
+                  <a:schemeClr val="tx1"/>
                 </a:solidFill>
                 <a:effectLst/>
-                <a:latin typeface="Udemy Sans"/>
-              </a:rPr>
-              <a:t> </a:t>
+                <a:latin typeface="Arial" panose="020B0604020202020204" pitchFamily="34" charset="0"/>
+                <a:cs typeface="Arial" panose="020B0604020202020204" pitchFamily="34" charset="0"/>
+              </a:rPr>
+              <a:t>🔷 3. Rəng və Stil Uyğunluğu</a:t>
+            </a:r>
+          </a:p>
+          <a:p>
+            <a:pPr marL="0" marR="0" lvl="0" indent="0" algn="l" defTabSz="914400" rtl="0" eaLnBrk="0" fontAlgn="base" latinLnBrk="0" hangingPunct="0">
+              <a:lnSpc>
+                <a:spcPct val="100000"/>
+              </a:lnSpc>
+              <a:spcBef>
+                <a:spcPct val="0"/>
+              </a:spcBef>
+              <a:spcAft>
+                <a:spcPct val="0"/>
+              </a:spcAft>
+              <a:buClrTx/>
+              <a:buSzTx/>
+              <a:buFontTx/>
+              <a:buNone/>
+              <a:tabLst/>
+            </a:pPr>
+            <a:r>
+              <a:rPr kumimoji="0" lang="en-US" altLang="en-US" sz="1200" b="1" i="0" u="none" strike="noStrike" cap="none" normalizeH="0" baseline="0">
+                <a:ln>
+                  <a:noFill/>
+                </a:ln>
+                <a:solidFill>
+                  <a:schemeClr val="tx1"/>
+                </a:solidFill>
+                <a:effectLst/>
+                <a:latin typeface="Arial" panose="020B0604020202020204" pitchFamily="34" charset="0"/>
+                <a:cs typeface="Arial" panose="020B0604020202020204" pitchFamily="34" charset="0"/>
+              </a:rPr>
+              <a:t>Yoxla:</a:t>
+            </a:r>
+          </a:p>
+          <a:p>
+            <a:pPr marL="171450" marR="0" lvl="0" indent="-171450" algn="l" defTabSz="914400" rtl="0" eaLnBrk="0" fontAlgn="base" latinLnBrk="0" hangingPunct="0">
+              <a:lnSpc>
+                <a:spcPct val="100000"/>
+              </a:lnSpc>
+              <a:spcBef>
+                <a:spcPct val="0"/>
+              </a:spcBef>
+              <a:spcAft>
+                <a:spcPct val="0"/>
+              </a:spcAft>
+              <a:buClrTx/>
+              <a:buSzTx/>
+              <a:buFont typeface="Arial" panose="020B0604020202020204" pitchFamily="34" charset="0"/>
+              <a:buChar char="•"/>
+              <a:tabLst/>
+            </a:pPr>
+            <a:r>
+              <a:rPr kumimoji="0" lang="en-US" altLang="en-US" sz="1200" b="0" i="0" u="none" strike="noStrike" cap="none" normalizeH="0" baseline="0">
+                <a:ln>
+                  <a:noFill/>
+                </a:ln>
+                <a:solidFill>
+                  <a:schemeClr val="tx1"/>
+                </a:solidFill>
+                <a:effectLst/>
+                <a:latin typeface="Arial" panose="020B0604020202020204" pitchFamily="34" charset="0"/>
+                <a:cs typeface="Arial" panose="020B0604020202020204" pitchFamily="34" charset="0"/>
+              </a:rPr>
+              <a:t>Rəng kodları (#HEX, rgba, hsl) Figma ilə eynidir?</a:t>
+            </a:r>
+          </a:p>
+          <a:p>
+            <a:pPr marL="171450" marR="0" lvl="0" indent="-171450" algn="l" defTabSz="914400" rtl="0" eaLnBrk="0" fontAlgn="base" latinLnBrk="0" hangingPunct="0">
+              <a:lnSpc>
+                <a:spcPct val="100000"/>
+              </a:lnSpc>
+              <a:spcBef>
+                <a:spcPct val="0"/>
+              </a:spcBef>
+              <a:spcAft>
+                <a:spcPct val="0"/>
+              </a:spcAft>
+              <a:buClrTx/>
+              <a:buSzTx/>
+              <a:buFont typeface="Arial" panose="020B0604020202020204" pitchFamily="34" charset="0"/>
+              <a:buChar char="•"/>
+              <a:tabLst/>
+            </a:pPr>
+            <a:r>
+              <a:rPr kumimoji="0" lang="en-US" altLang="en-US" sz="1200" b="0" i="0" u="none" strike="noStrike" cap="none" normalizeH="0" baseline="0">
+                <a:ln>
+                  <a:noFill/>
+                </a:ln>
+                <a:solidFill>
+                  <a:schemeClr val="tx1"/>
+                </a:solidFill>
+                <a:effectLst/>
+                <a:latin typeface="Arial" panose="020B0604020202020204" pitchFamily="34" charset="0"/>
+                <a:cs typeface="Arial" panose="020B0604020202020204" pitchFamily="34" charset="0"/>
+              </a:rPr>
+              <a:t>Figma-dakı komponentlərdəki kölgələr (box-shadow), border-radius, background opacity doğru tətbiq olunub?</a:t>
+            </a:r>
+          </a:p>
+          <a:p>
+            <a:pPr marL="171450" marR="0" lvl="0" indent="-171450" algn="l" defTabSz="914400" rtl="0" eaLnBrk="0" fontAlgn="base" latinLnBrk="0" hangingPunct="0">
+              <a:lnSpc>
+                <a:spcPct val="100000"/>
+              </a:lnSpc>
+              <a:spcBef>
+                <a:spcPct val="0"/>
+              </a:spcBef>
+              <a:spcAft>
+                <a:spcPct val="0"/>
+              </a:spcAft>
+              <a:buClrTx/>
+              <a:buSzTx/>
+              <a:buFont typeface="Arial" panose="020B0604020202020204" pitchFamily="34" charset="0"/>
+              <a:buChar char="•"/>
+              <a:tabLst/>
+            </a:pPr>
+            <a:r>
+              <a:rPr kumimoji="0" lang="en-US" altLang="en-US" sz="1200" b="0" i="0" u="none" strike="noStrike" cap="none" normalizeH="0" baseline="0">
+                <a:ln>
+                  <a:noFill/>
+                </a:ln>
+                <a:solidFill>
+                  <a:schemeClr val="tx1"/>
+                </a:solidFill>
+                <a:effectLst/>
+                <a:latin typeface="Arial" panose="020B0604020202020204" pitchFamily="34" charset="0"/>
+                <a:cs typeface="Arial" panose="020B0604020202020204" pitchFamily="34" charset="0"/>
+              </a:rPr>
+              <a:t>Hover və aktiv (active/focus) vəziyyətlərdə gözlənilən rənglər tətbiq olunubmu?</a:t>
+            </a:r>
+          </a:p>
+          <a:p>
+            <a:pPr marL="0" marR="0" lvl="0" indent="0" algn="l" defTabSz="914400" rtl="0" eaLnBrk="0" fontAlgn="base" latinLnBrk="0" hangingPunct="0">
+              <a:lnSpc>
+                <a:spcPct val="100000"/>
+              </a:lnSpc>
+              <a:spcBef>
+                <a:spcPct val="0"/>
+              </a:spcBef>
+              <a:spcAft>
+                <a:spcPct val="0"/>
+              </a:spcAft>
+              <a:buClrTx/>
+              <a:buSzTx/>
+              <a:buFontTx/>
+              <a:buNone/>
+              <a:tabLst/>
+            </a:pPr>
+            <a:endParaRPr kumimoji="0" lang="az-Latn-AZ" altLang="en-US" sz="1200" b="0" i="0" u="none" strike="noStrike" cap="none" normalizeH="0" baseline="0">
+              <a:ln>
+                <a:noFill/>
+              </a:ln>
+              <a:solidFill>
+                <a:schemeClr val="tx1"/>
+              </a:solidFill>
+              <a:effectLst/>
+              <a:latin typeface="Arial" panose="020B0604020202020204" pitchFamily="34" charset="0"/>
+              <a:cs typeface="Arial" panose="020B0604020202020204" pitchFamily="34" charset="0"/>
+            </a:endParaRPr>
+          </a:p>
+          <a:p>
+            <a:pPr marL="0" marR="0" lvl="0" indent="0" algn="l" defTabSz="914400" rtl="0" eaLnBrk="0" fontAlgn="base" latinLnBrk="0" hangingPunct="0">
+              <a:lnSpc>
+                <a:spcPct val="100000"/>
+              </a:lnSpc>
+              <a:spcBef>
+                <a:spcPct val="0"/>
+              </a:spcBef>
+              <a:spcAft>
+                <a:spcPct val="0"/>
+              </a:spcAft>
+              <a:buClrTx/>
+              <a:buSzTx/>
+              <a:buFontTx/>
+              <a:buNone/>
+              <a:tabLst/>
+            </a:pPr>
+            <a:endParaRPr kumimoji="0" lang="en-US" altLang="en-US" sz="1200" b="0" i="0" u="none" strike="noStrike" cap="none" normalizeH="0" baseline="0">
+              <a:ln>
+                <a:noFill/>
+              </a:ln>
+              <a:solidFill>
+                <a:schemeClr val="tx1"/>
+              </a:solidFill>
+              <a:effectLst/>
+              <a:latin typeface="Arial" panose="020B0604020202020204" pitchFamily="34" charset="0"/>
+              <a:cs typeface="Arial" panose="020B0604020202020204" pitchFamily="34" charset="0"/>
+            </a:endParaRPr>
+          </a:p>
+          <a:p>
+            <a:pPr algn="l"/>
+            <a:endParaRPr lang="az-Latn-AZ" sz="1200" b="0" i="0">
+              <a:solidFill>
+                <a:srgbClr val="303141"/>
+              </a:solidFill>
+              <a:effectLst/>
+              <a:latin typeface="Arial" panose="020B0604020202020204" pitchFamily="34" charset="0"/>
+              <a:cs typeface="Arial" panose="020B0604020202020204" pitchFamily="34" charset="0"/>
+            </a:endParaRPr>
+          </a:p>
+          <a:p>
+            <a:pPr algn="l"/>
+            <a:endParaRPr lang="az-Latn-AZ" sz="1200" b="0" i="0">
+              <a:solidFill>
+                <a:srgbClr val="303141"/>
+              </a:solidFill>
+              <a:effectLst/>
+              <a:latin typeface="Arial" panose="020B0604020202020204" pitchFamily="34" charset="0"/>
+              <a:cs typeface="Arial" panose="020B0604020202020204" pitchFamily="34" charset="0"/>
+            </a:endParaRPr>
+          </a:p>
+          <a:p>
+            <a:pPr algn="l"/>
+            <a:endParaRPr lang="az-Latn-AZ" sz="1200" b="0" i="0">
+              <a:solidFill>
+                <a:srgbClr val="303141"/>
+              </a:solidFill>
+              <a:effectLst/>
+              <a:latin typeface="Arial" panose="020B0604020202020204" pitchFamily="34" charset="0"/>
+              <a:cs typeface="Arial" panose="020B0604020202020204" pitchFamily="34" charset="0"/>
+            </a:endParaRPr>
+          </a:p>
+          <a:p>
+            <a:pPr>
+              <a:buNone/>
+            </a:pPr>
+            <a:r>
+              <a:rPr lang="en-US" sz="1200" b="1">
+                <a:latin typeface="Arial" panose="020B0604020202020204" pitchFamily="34" charset="0"/>
+                <a:cs typeface="Arial" panose="020B0604020202020204" pitchFamily="34" charset="0"/>
+              </a:rPr>
+              <a:t>🔷 4. İnteraktivlik və Davranış</a:t>
+            </a:r>
+          </a:p>
+          <a:p>
+            <a:pPr>
+              <a:buNone/>
+            </a:pPr>
+            <a:r>
+              <a:rPr lang="en-US" sz="1200" b="1">
+                <a:latin typeface="Arial" panose="020B0604020202020204" pitchFamily="34" charset="0"/>
+                <a:cs typeface="Arial" panose="020B0604020202020204" pitchFamily="34" charset="0"/>
+              </a:rPr>
+              <a:t>Yoxla:</a:t>
+            </a:r>
+          </a:p>
+          <a:p>
+            <a:pPr marL="171450" indent="-171450">
+              <a:buFont typeface="Arial" panose="020B0604020202020204" pitchFamily="34" charset="0"/>
+              <a:buChar char="•"/>
+            </a:pPr>
+            <a:r>
+              <a:rPr lang="en-US" sz="1200">
+                <a:latin typeface="Arial" panose="020B0604020202020204" pitchFamily="34" charset="0"/>
+                <a:cs typeface="Arial" panose="020B0604020202020204" pitchFamily="34" charset="0"/>
+              </a:rPr>
+              <a:t>Figma prototipində göstərilən animasiyalar, keçidlər realda işləyirmi?</a:t>
+            </a:r>
+          </a:p>
+          <a:p>
+            <a:pPr marL="171450" indent="-171450">
+              <a:buFont typeface="Arial" panose="020B0604020202020204" pitchFamily="34" charset="0"/>
+              <a:buChar char="•"/>
+            </a:pPr>
+            <a:r>
+              <a:rPr lang="en-US" sz="1200">
+                <a:latin typeface="Arial" panose="020B0604020202020204" pitchFamily="34" charset="0"/>
+                <a:cs typeface="Arial" panose="020B0604020202020204" pitchFamily="34" charset="0"/>
+              </a:rPr>
+              <a:t>Modal, dropdown, tab və s. komponentlərin klik davranışları düzgünmü?</a:t>
+            </a:r>
+          </a:p>
+          <a:p>
+            <a:pPr marL="171450" indent="-171450">
+              <a:buFont typeface="Arial" panose="020B0604020202020204" pitchFamily="34" charset="0"/>
+              <a:buChar char="•"/>
+            </a:pPr>
+            <a:r>
+              <a:rPr lang="en-US" sz="1200">
+                <a:latin typeface="Arial" panose="020B0604020202020204" pitchFamily="34" charset="0"/>
+                <a:cs typeface="Arial" panose="020B0604020202020204" pitchFamily="34" charset="0"/>
+              </a:rPr>
+              <a:t>Figma-da göstərilən </a:t>
+            </a:r>
+            <a:r>
+              <a:rPr lang="en-US" sz="1200" b="1">
+                <a:latin typeface="Arial" panose="020B0604020202020204" pitchFamily="34" charset="0"/>
+                <a:cs typeface="Arial" panose="020B0604020202020204" pitchFamily="34" charset="0"/>
+              </a:rPr>
+              <a:t>loading indicator</a:t>
+            </a:r>
+            <a:r>
+              <a:rPr lang="en-US" sz="1200">
+                <a:latin typeface="Arial" panose="020B0604020202020204" pitchFamily="34" charset="0"/>
+                <a:cs typeface="Arial" panose="020B0604020202020204" pitchFamily="34" charset="0"/>
+              </a:rPr>
+              <a:t>, </a:t>
+            </a:r>
+            <a:r>
+              <a:rPr lang="en-US" sz="1200" b="1">
+                <a:latin typeface="Arial" panose="020B0604020202020204" pitchFamily="34" charset="0"/>
+                <a:cs typeface="Arial" panose="020B0604020202020204" pitchFamily="34" charset="0"/>
+              </a:rPr>
+              <a:t>success</a:t>
+            </a:r>
+            <a:r>
+              <a:rPr lang="en-US" sz="1200">
+                <a:latin typeface="Arial" panose="020B0604020202020204" pitchFamily="34" charset="0"/>
+                <a:cs typeface="Arial" panose="020B0604020202020204" pitchFamily="34" charset="0"/>
+              </a:rPr>
+              <a:t>, </a:t>
+            </a:r>
+            <a:r>
+              <a:rPr lang="en-US" sz="1200" b="1">
+                <a:latin typeface="Arial" panose="020B0604020202020204" pitchFamily="34" charset="0"/>
+                <a:cs typeface="Arial" panose="020B0604020202020204" pitchFamily="34" charset="0"/>
+              </a:rPr>
+              <a:t>error</a:t>
+            </a:r>
+            <a:r>
+              <a:rPr lang="en-US" sz="1200">
+                <a:latin typeface="Arial" panose="020B0604020202020204" pitchFamily="34" charset="0"/>
+                <a:cs typeface="Arial" panose="020B0604020202020204" pitchFamily="34" charset="0"/>
+              </a:rPr>
+              <a:t> mesajları development versiyada varmı?</a:t>
+            </a:r>
+          </a:p>
+          <a:p>
+            <a:pPr algn="l"/>
+            <a:endParaRPr lang="az-Latn-AZ" sz="1200" b="0" i="0">
+              <a:solidFill>
+                <a:srgbClr val="303141"/>
+              </a:solidFill>
+              <a:effectLst/>
+              <a:latin typeface="Arial" panose="020B0604020202020204" pitchFamily="34" charset="0"/>
+              <a:cs typeface="Arial" panose="020B0604020202020204" pitchFamily="34" charset="0"/>
+            </a:endParaRPr>
+          </a:p>
+          <a:p>
+            <a:pPr algn="l"/>
+            <a:endParaRPr lang="az-Latn-AZ" sz="1200" b="0" i="0">
+              <a:solidFill>
+                <a:srgbClr val="303141"/>
+              </a:solidFill>
+              <a:effectLst/>
+              <a:latin typeface="Arial" panose="020B0604020202020204" pitchFamily="34" charset="0"/>
+              <a:cs typeface="Arial" panose="020B0604020202020204" pitchFamily="34" charset="0"/>
+            </a:endParaRPr>
+          </a:p>
+          <a:p>
+            <a:pPr algn="l"/>
+            <a:endParaRPr lang="az-Latn-AZ" sz="1200" b="0" i="0">
+              <a:solidFill>
+                <a:srgbClr val="303141"/>
+              </a:solidFill>
+              <a:effectLst/>
+              <a:latin typeface="Arial" panose="020B0604020202020204" pitchFamily="34" charset="0"/>
+              <a:cs typeface="Arial" panose="020B0604020202020204" pitchFamily="34" charset="0"/>
+            </a:endParaRPr>
+          </a:p>
+          <a:p>
+            <a:pPr algn="l"/>
+            <a:endParaRPr lang="az-Latn-AZ" sz="1200">
+              <a:solidFill>
+                <a:srgbClr val="303141"/>
+              </a:solidFill>
+              <a:latin typeface="Arial" panose="020B0604020202020204" pitchFamily="34" charset="0"/>
+              <a:cs typeface="Arial" panose="020B0604020202020204" pitchFamily="34" charset="0"/>
+            </a:endParaRPr>
+          </a:p>
+          <a:p>
+            <a:pPr algn="l"/>
+            <a:endParaRPr lang="az-Latn-AZ" sz="1200">
+              <a:solidFill>
+                <a:srgbClr val="303141"/>
+              </a:solidFill>
+              <a:latin typeface="Arial" panose="020B0604020202020204" pitchFamily="34" charset="0"/>
+              <a:cs typeface="Arial" panose="020B0604020202020204" pitchFamily="34" charset="0"/>
+            </a:endParaRPr>
+          </a:p>
+          <a:p>
+            <a:pPr marL="0" marR="0" lvl="0" indent="0" algn="l" defTabSz="914400" rtl="0" eaLnBrk="0" fontAlgn="base" latinLnBrk="0" hangingPunct="0">
+              <a:lnSpc>
+                <a:spcPct val="100000"/>
+              </a:lnSpc>
+              <a:spcBef>
+                <a:spcPct val="0"/>
+              </a:spcBef>
+              <a:spcAft>
+                <a:spcPct val="0"/>
+              </a:spcAft>
+              <a:buClrTx/>
+              <a:buSzTx/>
+              <a:buFontTx/>
+              <a:buNone/>
+              <a:tabLst/>
+            </a:pPr>
+            <a:r>
+              <a:rPr kumimoji="0" lang="en-US" altLang="en-US" sz="1200" b="1" i="0" u="none" strike="noStrike" cap="none" normalizeH="0" baseline="0">
+                <a:ln>
+                  <a:noFill/>
+                </a:ln>
+                <a:solidFill>
+                  <a:schemeClr val="tx1"/>
+                </a:solidFill>
+                <a:effectLst/>
+                <a:latin typeface="Arial" panose="020B0604020202020204" pitchFamily="34" charset="0"/>
+                <a:cs typeface="Arial" panose="020B0604020202020204" pitchFamily="34" charset="0"/>
+              </a:rPr>
+              <a:t>🔷 5. Element Yerləşimi (Alignment)</a:t>
+            </a:r>
+          </a:p>
+          <a:p>
+            <a:pPr marL="0" marR="0" lvl="0" indent="0" algn="l" defTabSz="914400" rtl="0" eaLnBrk="0" fontAlgn="base" latinLnBrk="0" hangingPunct="0">
+              <a:lnSpc>
+                <a:spcPct val="100000"/>
+              </a:lnSpc>
+              <a:spcBef>
+                <a:spcPct val="0"/>
+              </a:spcBef>
+              <a:spcAft>
+                <a:spcPct val="0"/>
+              </a:spcAft>
+              <a:buClrTx/>
+              <a:buSzTx/>
+              <a:buFontTx/>
+              <a:buNone/>
+              <a:tabLst/>
+            </a:pPr>
+            <a:r>
+              <a:rPr kumimoji="0" lang="en-US" altLang="en-US" sz="1200" b="1" i="0" u="none" strike="noStrike" cap="none" normalizeH="0" baseline="0">
+                <a:ln>
+                  <a:noFill/>
+                </a:ln>
+                <a:solidFill>
+                  <a:schemeClr val="tx1"/>
+                </a:solidFill>
+                <a:effectLst/>
+                <a:latin typeface="Arial" panose="020B0604020202020204" pitchFamily="34" charset="0"/>
+                <a:cs typeface="Arial" panose="020B0604020202020204" pitchFamily="34" charset="0"/>
+              </a:rPr>
+              <a:t>Yoxla:</a:t>
+            </a:r>
+          </a:p>
+          <a:p>
+            <a:pPr marL="171450" marR="0" lvl="0" indent="-171450" algn="l" defTabSz="914400" rtl="0" eaLnBrk="0" fontAlgn="base" latinLnBrk="0" hangingPunct="0">
+              <a:lnSpc>
+                <a:spcPct val="100000"/>
+              </a:lnSpc>
+              <a:spcBef>
+                <a:spcPct val="0"/>
+              </a:spcBef>
+              <a:spcAft>
+                <a:spcPct val="0"/>
+              </a:spcAft>
+              <a:buClrTx/>
+              <a:buSzTx/>
+              <a:buFont typeface="Arial" panose="020B0604020202020204" pitchFamily="34" charset="0"/>
+              <a:buChar char="•"/>
+              <a:tabLst/>
+            </a:pPr>
+            <a:r>
+              <a:rPr kumimoji="0" lang="en-US" altLang="en-US" sz="1200" b="0" i="0" u="none" strike="noStrike" cap="none" normalizeH="0" baseline="0">
+                <a:ln>
+                  <a:noFill/>
+                </a:ln>
+                <a:solidFill>
+                  <a:schemeClr val="tx1"/>
+                </a:solidFill>
+                <a:effectLst/>
+                <a:latin typeface="Arial" panose="020B0604020202020204" pitchFamily="34" charset="0"/>
+                <a:cs typeface="Arial" panose="020B0604020202020204" pitchFamily="34" charset="0"/>
+              </a:rPr>
+              <a:t>Grid sisteminə uyğun hizalanma (məs: Bootstrap/Tailwind col sistemi)</a:t>
+            </a:r>
+          </a:p>
+          <a:p>
+            <a:pPr marL="171450" marR="0" lvl="0" indent="-171450" algn="l" defTabSz="914400" rtl="0" eaLnBrk="0" fontAlgn="base" latinLnBrk="0" hangingPunct="0">
+              <a:lnSpc>
+                <a:spcPct val="100000"/>
+              </a:lnSpc>
+              <a:spcBef>
+                <a:spcPct val="0"/>
+              </a:spcBef>
+              <a:spcAft>
+                <a:spcPct val="0"/>
+              </a:spcAft>
+              <a:buClrTx/>
+              <a:buSzTx/>
+              <a:buFont typeface="Arial" panose="020B0604020202020204" pitchFamily="34" charset="0"/>
+              <a:buChar char="•"/>
+              <a:tabLst/>
+            </a:pPr>
+            <a:r>
+              <a:rPr kumimoji="0" lang="en-US" altLang="en-US" sz="1200" b="0" i="0" u="none" strike="noStrike" cap="none" normalizeH="0" baseline="0">
+                <a:ln>
+                  <a:noFill/>
+                </a:ln>
+                <a:solidFill>
+                  <a:schemeClr val="tx1"/>
+                </a:solidFill>
+                <a:effectLst/>
+                <a:latin typeface="Arial" panose="020B0604020202020204" pitchFamily="34" charset="0"/>
+                <a:cs typeface="Arial" panose="020B0604020202020204" pitchFamily="34" charset="0"/>
+              </a:rPr>
+              <a:t>Sol/sağ hizalanmalar, orta hizalanmalar Figma ilə eynidirmi?</a:t>
+            </a:r>
+          </a:p>
+          <a:p>
+            <a:pPr marL="171450" marR="0" lvl="0" indent="-171450" algn="l" defTabSz="914400" rtl="0" eaLnBrk="0" fontAlgn="base" latinLnBrk="0" hangingPunct="0">
+              <a:lnSpc>
+                <a:spcPct val="100000"/>
+              </a:lnSpc>
+              <a:spcBef>
+                <a:spcPct val="0"/>
+              </a:spcBef>
+              <a:spcAft>
+                <a:spcPct val="0"/>
+              </a:spcAft>
+              <a:buClrTx/>
+              <a:buSzTx/>
+              <a:buFont typeface="Arial" panose="020B0604020202020204" pitchFamily="34" charset="0"/>
+              <a:buChar char="•"/>
+              <a:tabLst/>
+            </a:pPr>
+            <a:r>
+              <a:rPr kumimoji="0" lang="en-US" altLang="en-US" sz="1200" b="0" i="0" u="none" strike="noStrike" cap="none" normalizeH="0" baseline="0">
+                <a:ln>
+                  <a:noFill/>
+                </a:ln>
+                <a:solidFill>
+                  <a:schemeClr val="tx1"/>
+                </a:solidFill>
+                <a:effectLst/>
+                <a:latin typeface="Arial" panose="020B0604020202020204" pitchFamily="34" charset="0"/>
+                <a:cs typeface="Arial" panose="020B0604020202020204" pitchFamily="34" charset="0"/>
+              </a:rPr>
+              <a:t>Komponentlər arasındakı boşluq (gap, margin-bottom, margin-top) Figma-ya uyğunmu?</a:t>
             </a:r>
           </a:p>
         </p:txBody>

</xml_diff>